<commit_message>
Made updates to slides for 2025 run
</commit_message>
<xml_diff>
--- a/Part 2/Slides part 2.pptx
+++ b/Part 2/Slides part 2.pptx
@@ -5,7 +5,7 @@
     <p:sldMasterId id="2147483648" r:id="rId1"/>
   </p:sldMasterIdLst>
   <p:notesMasterIdLst>
-    <p:notesMasterId r:id="rId24"/>
+    <p:notesMasterId r:id="rId25"/>
   </p:notesMasterIdLst>
   <p:sldIdLst>
     <p:sldId id="256" r:id="rId2"/>
@@ -29,7 +29,8 @@
     <p:sldId id="270" r:id="rId20"/>
     <p:sldId id="281" r:id="rId21"/>
     <p:sldId id="282" r:id="rId22"/>
-    <p:sldId id="260" r:id="rId23"/>
+    <p:sldId id="284" r:id="rId23"/>
+    <p:sldId id="260" r:id="rId24"/>
   </p:sldIdLst>
   <p:sldSz cx="12192000" cy="6858000"/>
   <p:notesSz cx="6858000" cy="9144000"/>
@@ -1882,7 +1883,7 @@
           <a:p>
             <a:fld id="{0CD18AB5-B411-4243-B514-8BBA48826DCA}" type="datetimeFigureOut">
               <a:rPr lang="en-US" smtClean="0"/>
-              <a:t>5/15/2024</a:t>
+              <a:t>6/2/2025</a:t>
             </a:fld>
             <a:endParaRPr lang="en-US"/>
           </a:p>
@@ -2278,7 +2279,10 @@
           <a:bodyPr/>
           <a:lstStyle/>
           <a:p>
-            <a:endParaRPr lang="en-US"/>
+            <a:r>
+              <a:rPr lang="en-GB" dirty="0"/>
+              <a:t>App working through</a:t>
+            </a:r>
           </a:p>
         </p:txBody>
       </p:sp>
@@ -2299,7 +2303,7 @@
           <a:p>
             <a:fld id="{3CF06A7E-4467-2B45-844F-B74EDA7363B5}" type="slidenum">
               <a:rPr lang="en-US" smtClean="0"/>
-              <a:t>6</a:t>
+              <a:t>2</a:t>
             </a:fld>
             <a:endParaRPr lang="en-US"/>
           </a:p>
@@ -2308,7 +2312,7 @@
     </p:spTree>
     <p:extLst>
       <p:ext uri="{BB962C8B-B14F-4D97-AF65-F5344CB8AC3E}">
-        <p14:creationId xmlns:p14="http://schemas.microsoft.com/office/powerpoint/2010/main" val="2061570769"/>
+        <p14:creationId xmlns:p14="http://schemas.microsoft.com/office/powerpoint/2010/main" val="2447830704"/>
       </p:ext>
     </p:extLst>
   </p:cSld>
@@ -2383,7 +2387,7 @@
           <a:p>
             <a:fld id="{3CF06A7E-4467-2B45-844F-B74EDA7363B5}" type="slidenum">
               <a:rPr lang="en-US" smtClean="0"/>
-              <a:t>9</a:t>
+              <a:t>6</a:t>
             </a:fld>
             <a:endParaRPr lang="en-US"/>
           </a:p>
@@ -2392,7 +2396,7 @@
     </p:spTree>
     <p:extLst>
       <p:ext uri="{BB962C8B-B14F-4D97-AF65-F5344CB8AC3E}">
-        <p14:creationId xmlns:p14="http://schemas.microsoft.com/office/powerpoint/2010/main" val="3843663641"/>
+        <p14:creationId xmlns:p14="http://schemas.microsoft.com/office/powerpoint/2010/main" val="2061570769"/>
       </p:ext>
     </p:extLst>
   </p:cSld>
@@ -2446,7 +2450,10 @@
           <a:bodyPr/>
           <a:lstStyle/>
           <a:p>
-            <a:endParaRPr lang="en-US"/>
+            <a:r>
+              <a:rPr lang="en-US" dirty="0"/>
+              <a:t>2 types of plots</a:t>
+            </a:r>
           </a:p>
         </p:txBody>
       </p:sp>
@@ -2467,6 +2474,90 @@
           <a:p>
             <a:fld id="{3CF06A7E-4467-2B45-844F-B74EDA7363B5}" type="slidenum">
               <a:rPr lang="en-US" smtClean="0"/>
+              <a:t>9</a:t>
+            </a:fld>
+            <a:endParaRPr lang="en-US"/>
+          </a:p>
+        </p:txBody>
+      </p:sp>
+    </p:spTree>
+    <p:extLst>
+      <p:ext uri="{BB962C8B-B14F-4D97-AF65-F5344CB8AC3E}">
+        <p14:creationId xmlns:p14="http://schemas.microsoft.com/office/powerpoint/2010/main" val="3843663641"/>
+      </p:ext>
+    </p:extLst>
+  </p:cSld>
+  <p:clrMapOvr>
+    <a:masterClrMapping/>
+  </p:clrMapOvr>
+</p:notes>
+</file>
+
+<file path=ppt/notesSlides/notesSlide5.xml><?xml version="1.0" encoding="utf-8"?>
+<p:notes xmlns:a="http://schemas.openxmlformats.org/drawingml/2006/main" xmlns:r="http://schemas.openxmlformats.org/officeDocument/2006/relationships" xmlns:p="http://schemas.openxmlformats.org/presentationml/2006/main">
+  <p:cSld>
+    <p:spTree>
+      <p:nvGrpSpPr>
+        <p:cNvPr id="1" name=""/>
+        <p:cNvGrpSpPr/>
+        <p:nvPr/>
+      </p:nvGrpSpPr>
+      <p:grpSpPr>
+        <a:xfrm>
+          <a:off x="0" y="0"/>
+          <a:ext cx="0" cy="0"/>
+          <a:chOff x="0" y="0"/>
+          <a:chExt cx="0" cy="0"/>
+        </a:xfrm>
+      </p:grpSpPr>
+      <p:sp>
+        <p:nvSpPr>
+          <p:cNvPr id="2" name="Slide Image Placeholder 1"/>
+          <p:cNvSpPr>
+            <a:spLocks noGrp="1" noRot="1" noChangeAspect="1"/>
+          </p:cNvSpPr>
+          <p:nvPr>
+            <p:ph type="sldImg"/>
+          </p:nvPr>
+        </p:nvSpPr>
+        <p:spPr/>
+      </p:sp>
+      <p:sp>
+        <p:nvSpPr>
+          <p:cNvPr id="3" name="Notes Placeholder 2"/>
+          <p:cNvSpPr>
+            <a:spLocks noGrp="1"/>
+          </p:cNvSpPr>
+          <p:nvPr>
+            <p:ph type="body" idx="1"/>
+          </p:nvPr>
+        </p:nvSpPr>
+        <p:spPr/>
+        <p:txBody>
+          <a:bodyPr/>
+          <a:lstStyle/>
+          <a:p>
+            <a:endParaRPr lang="en-US"/>
+          </a:p>
+        </p:txBody>
+      </p:sp>
+      <p:sp>
+        <p:nvSpPr>
+          <p:cNvPr id="4" name="Slide Number Placeholder 3"/>
+          <p:cNvSpPr>
+            <a:spLocks noGrp="1"/>
+          </p:cNvSpPr>
+          <p:nvPr>
+            <p:ph type="sldNum" sz="quarter" idx="5"/>
+          </p:nvPr>
+        </p:nvSpPr>
+        <p:spPr/>
+        <p:txBody>
+          <a:bodyPr/>
+          <a:lstStyle/>
+          <a:p>
+            <a:fld id="{3CF06A7E-4467-2B45-844F-B74EDA7363B5}" type="slidenum">
+              <a:rPr lang="en-US" smtClean="0"/>
               <a:t>11</a:t>
             </a:fld>
             <a:endParaRPr lang="en-US"/>
@@ -2477,6 +2568,93 @@
     <p:extLst>
       <p:ext uri="{BB962C8B-B14F-4D97-AF65-F5344CB8AC3E}">
         <p14:creationId xmlns:p14="http://schemas.microsoft.com/office/powerpoint/2010/main" val="3865724894"/>
+      </p:ext>
+    </p:extLst>
+  </p:cSld>
+  <p:clrMapOvr>
+    <a:masterClrMapping/>
+  </p:clrMapOvr>
+</p:notes>
+</file>
+
+<file path=ppt/notesSlides/notesSlide6.xml><?xml version="1.0" encoding="utf-8"?>
+<p:notes xmlns:a="http://schemas.openxmlformats.org/drawingml/2006/main" xmlns:r="http://schemas.openxmlformats.org/officeDocument/2006/relationships" xmlns:p="http://schemas.openxmlformats.org/presentationml/2006/main">
+  <p:cSld>
+    <p:spTree>
+      <p:nvGrpSpPr>
+        <p:cNvPr id="1" name=""/>
+        <p:cNvGrpSpPr/>
+        <p:nvPr/>
+      </p:nvGrpSpPr>
+      <p:grpSpPr>
+        <a:xfrm>
+          <a:off x="0" y="0"/>
+          <a:ext cx="0" cy="0"/>
+          <a:chOff x="0" y="0"/>
+          <a:chExt cx="0" cy="0"/>
+        </a:xfrm>
+      </p:grpSpPr>
+      <p:sp>
+        <p:nvSpPr>
+          <p:cNvPr id="2" name="Slide Image Placeholder 1"/>
+          <p:cNvSpPr>
+            <a:spLocks noGrp="1" noRot="1" noChangeAspect="1"/>
+          </p:cNvSpPr>
+          <p:nvPr>
+            <p:ph type="sldImg"/>
+          </p:nvPr>
+        </p:nvSpPr>
+        <p:spPr/>
+      </p:sp>
+      <p:sp>
+        <p:nvSpPr>
+          <p:cNvPr id="3" name="Notes Placeholder 2"/>
+          <p:cNvSpPr>
+            <a:spLocks noGrp="1"/>
+          </p:cNvSpPr>
+          <p:nvPr>
+            <p:ph type="body" idx="1"/>
+          </p:nvPr>
+        </p:nvSpPr>
+        <p:spPr/>
+        <p:txBody>
+          <a:bodyPr/>
+          <a:lstStyle/>
+          <a:p>
+            <a:r>
+              <a:rPr lang="en-GB"/>
+              <a:t>Simple app</a:t>
+            </a:r>
+          </a:p>
+        </p:txBody>
+      </p:sp>
+      <p:sp>
+        <p:nvSpPr>
+          <p:cNvPr id="4" name="Slide Number Placeholder 3"/>
+          <p:cNvSpPr>
+            <a:spLocks noGrp="1"/>
+          </p:cNvSpPr>
+          <p:nvPr>
+            <p:ph type="sldNum" sz="quarter" idx="5"/>
+          </p:nvPr>
+        </p:nvSpPr>
+        <p:spPr/>
+        <p:txBody>
+          <a:bodyPr/>
+          <a:lstStyle/>
+          <a:p>
+            <a:fld id="{3CF06A7E-4467-2B45-844F-B74EDA7363B5}" type="slidenum">
+              <a:rPr lang="en-US" smtClean="0"/>
+              <a:t>16</a:t>
+            </a:fld>
+            <a:endParaRPr lang="en-US"/>
+          </a:p>
+        </p:txBody>
+      </p:sp>
+    </p:spTree>
+    <p:extLst>
+      <p:ext uri="{BB962C8B-B14F-4D97-AF65-F5344CB8AC3E}">
+        <p14:creationId xmlns:p14="http://schemas.microsoft.com/office/powerpoint/2010/main" val="1776795460"/>
       </p:ext>
     </p:extLst>
   </p:cSld>
@@ -2716,7 +2894,7 @@
             <a:fld id="{B61BEF0D-F0BB-DE4B-95CE-6DB70DBA9567}" type="datetimeFigureOut">
               <a:rPr lang="en-US" dirty="0"/>
               <a:pPr/>
-              <a:t>5/15/2024</a:t>
+              <a:t>6/2/2025</a:t>
             </a:fld>
             <a:endParaRPr lang="en-US" dirty="0"/>
           </a:p>
@@ -3047,7 +3225,7 @@
             <a:fld id="{B61BEF0D-F0BB-DE4B-95CE-6DB70DBA9567}" type="datetimeFigureOut">
               <a:rPr lang="en-US" dirty="0"/>
               <a:pPr/>
-              <a:t>5/15/2024</a:t>
+              <a:t>6/2/2025</a:t>
             </a:fld>
             <a:endParaRPr lang="en-US" dirty="0"/>
           </a:p>
@@ -3322,7 +3500,7 @@
             <a:fld id="{B61BEF0D-F0BB-DE4B-95CE-6DB70DBA9567}" type="datetimeFigureOut">
               <a:rPr lang="en-US" dirty="0"/>
               <a:pPr/>
-              <a:t>5/15/2024</a:t>
+              <a:t>6/2/2025</a:t>
             </a:fld>
             <a:endParaRPr lang="en-US" dirty="0"/>
           </a:p>
@@ -3887,7 +4065,7 @@
             <a:fld id="{B61BEF0D-F0BB-DE4B-95CE-6DB70DBA9567}" type="datetimeFigureOut">
               <a:rPr lang="en-US" dirty="0"/>
               <a:pPr/>
-              <a:t>5/15/2024</a:t>
+              <a:t>6/2/2025</a:t>
             </a:fld>
             <a:endParaRPr lang="en-US" dirty="0"/>
           </a:p>
@@ -4162,7 +4340,7 @@
             <a:fld id="{B61BEF0D-F0BB-DE4B-95CE-6DB70DBA9567}" type="datetimeFigureOut">
               <a:rPr lang="en-US" dirty="0"/>
               <a:pPr/>
-              <a:t>5/15/2024</a:t>
+              <a:t>6/2/2025</a:t>
             </a:fld>
             <a:endParaRPr lang="en-US" dirty="0"/>
           </a:p>
@@ -4721,7 +4899,7 @@
             <a:fld id="{B61BEF0D-F0BB-DE4B-95CE-6DB70DBA9567}" type="datetimeFigureOut">
               <a:rPr lang="en-US" dirty="0"/>
               <a:pPr/>
-              <a:t>5/15/2024</a:t>
+              <a:t>6/2/2025</a:t>
             </a:fld>
             <a:endParaRPr lang="en-US" dirty="0"/>
           </a:p>
@@ -5045,7 +5223,7 @@
             <a:fld id="{B61BEF0D-F0BB-DE4B-95CE-6DB70DBA9567}" type="datetimeFigureOut">
               <a:rPr lang="en-US" dirty="0"/>
               <a:pPr/>
-              <a:t>5/15/2024</a:t>
+              <a:t>6/2/2025</a:t>
             </a:fld>
             <a:endParaRPr lang="en-US" dirty="0"/>
           </a:p>
@@ -5219,7 +5397,7 @@
             <a:fld id="{B61BEF0D-F0BB-DE4B-95CE-6DB70DBA9567}" type="datetimeFigureOut">
               <a:rPr lang="en-US" dirty="0"/>
               <a:pPr/>
-              <a:t>5/15/2024</a:t>
+              <a:t>6/2/2025</a:t>
             </a:fld>
             <a:endParaRPr lang="en-US" dirty="0"/>
           </a:p>
@@ -5454,7 +5632,7 @@
             <a:fld id="{B61BEF0D-F0BB-DE4B-95CE-6DB70DBA9567}" type="datetimeFigureOut">
               <a:rPr lang="en-US" dirty="0"/>
               <a:pPr/>
-              <a:t>5/15/2024</a:t>
+              <a:t>6/2/2025</a:t>
             </a:fld>
             <a:endParaRPr lang="en-US" dirty="0"/>
           </a:p>
@@ -5651,7 +5829,7 @@
             <a:fld id="{B61BEF0D-F0BB-DE4B-95CE-6DB70DBA9567}" type="datetimeFigureOut">
               <a:rPr lang="en-US" dirty="0"/>
               <a:pPr/>
-              <a:t>5/15/2024</a:t>
+              <a:t>6/2/2025</a:t>
             </a:fld>
             <a:endParaRPr lang="en-US" dirty="0"/>
           </a:p>
@@ -5924,7 +6102,7 @@
             <a:fld id="{B61BEF0D-F0BB-DE4B-95CE-6DB70DBA9567}" type="datetimeFigureOut">
               <a:rPr lang="en-US" dirty="0"/>
               <a:pPr/>
-              <a:t>5/15/2024</a:t>
+              <a:t>6/2/2025</a:t>
             </a:fld>
             <a:endParaRPr lang="en-US" dirty="0"/>
           </a:p>
@@ -6187,7 +6365,7 @@
             <a:fld id="{B61BEF0D-F0BB-DE4B-95CE-6DB70DBA9567}" type="datetimeFigureOut">
               <a:rPr lang="en-US" dirty="0"/>
               <a:pPr/>
-              <a:t>5/15/2024</a:t>
+              <a:t>6/2/2025</a:t>
             </a:fld>
             <a:endParaRPr lang="en-US" dirty="0"/>
           </a:p>
@@ -6558,7 +6736,7 @@
             <a:fld id="{B61BEF0D-F0BB-DE4B-95CE-6DB70DBA9567}" type="datetimeFigureOut">
               <a:rPr lang="en-US" dirty="0"/>
               <a:pPr/>
-              <a:t>5/15/2024</a:t>
+              <a:t>6/2/2025</a:t>
             </a:fld>
             <a:endParaRPr lang="en-US" dirty="0"/>
           </a:p>
@@ -6703,7 +6881,7 @@
             <a:fld id="{B61BEF0D-F0BB-DE4B-95CE-6DB70DBA9567}" type="datetimeFigureOut">
               <a:rPr lang="en-US" dirty="0"/>
               <a:pPr/>
-              <a:t>5/15/2024</a:t>
+              <a:t>6/2/2025</a:t>
             </a:fld>
             <a:endParaRPr lang="en-US" dirty="0"/>
           </a:p>
@@ -6825,7 +7003,7 @@
             <a:fld id="{B61BEF0D-F0BB-DE4B-95CE-6DB70DBA9567}" type="datetimeFigureOut">
               <a:rPr lang="en-US" dirty="0"/>
               <a:pPr/>
-              <a:t>5/15/2024</a:t>
+              <a:t>6/2/2025</a:t>
             </a:fld>
             <a:endParaRPr lang="en-US" dirty="0"/>
           </a:p>
@@ -7107,7 +7285,7 @@
             <a:fld id="{B61BEF0D-F0BB-DE4B-95CE-6DB70DBA9567}" type="datetimeFigureOut">
               <a:rPr lang="en-US" dirty="0"/>
               <a:pPr/>
-              <a:t>5/15/2024</a:t>
+              <a:t>6/2/2025</a:t>
             </a:fld>
             <a:endParaRPr lang="en-US" dirty="0"/>
           </a:p>
@@ -7428,7 +7606,7 @@
             <a:fld id="{B61BEF0D-F0BB-DE4B-95CE-6DB70DBA9567}" type="datetimeFigureOut">
               <a:rPr lang="en-US" dirty="0"/>
               <a:pPr/>
-              <a:t>5/15/2024</a:t>
+              <a:t>6/2/2025</a:t>
             </a:fld>
             <a:endParaRPr lang="en-US" dirty="0"/>
           </a:p>
@@ -7639,7 +7817,7 @@
             <a:fld id="{B61BEF0D-F0BB-DE4B-95CE-6DB70DBA9567}" type="datetimeFigureOut">
               <a:rPr lang="en-US" dirty="0"/>
               <a:pPr/>
-              <a:t>5/15/2024</a:t>
+              <a:t>6/2/2025</a:t>
             </a:fld>
             <a:endParaRPr lang="en-US" dirty="0"/>
           </a:p>
@@ -8244,6 +8422,18 @@
   <p:clrMapOvr>
     <a:masterClrMapping/>
   </p:clrMapOvr>
+  <mc:AlternateContent xmlns:mc="http://schemas.openxmlformats.org/markup-compatibility/2006">
+    <mc:Choice xmlns:p14="http://schemas.microsoft.com/office/powerpoint/2010/main" Requires="p14">
+      <p:transition spd="med" p14:dur="700">
+        <p:fade/>
+      </p:transition>
+    </mc:Choice>
+    <mc:Fallback>
+      <p:transition spd="med">
+        <p:fade/>
+      </p:transition>
+    </mc:Fallback>
+  </mc:AlternateContent>
 </p:sld>
 </file>
 
@@ -9508,6 +9698,41 @@
           </a:fontRef>
         </p:style>
       </p:cxnSp>
+      <p:sp>
+        <p:nvSpPr>
+          <p:cNvPr id="6" name="TextBox 5">
+            <a:extLst>
+              <a:ext uri="{FF2B5EF4-FFF2-40B4-BE49-F238E27FC236}">
+                <a16:creationId xmlns:a16="http://schemas.microsoft.com/office/drawing/2014/main" id="{AF1A66B1-53B2-4A38-A696-CBB3D379843D}"/>
+              </a:ext>
+            </a:extLst>
+          </p:cNvPr>
+          <p:cNvSpPr txBox="1"/>
+          <p:nvPr/>
+        </p:nvSpPr>
+        <p:spPr>
+          <a:xfrm>
+            <a:off x="9027267" y="2830035"/>
+            <a:ext cx="2577830" cy="830997"/>
+          </a:xfrm>
+          <a:prstGeom prst="rect">
+            <a:avLst/>
+          </a:prstGeom>
+          <a:noFill/>
+        </p:spPr>
+        <p:txBody>
+          <a:bodyPr wrap="square" rtlCol="0">
+            <a:spAutoFit/>
+          </a:bodyPr>
+          <a:lstStyle/>
+          <a:p>
+            <a:r>
+              <a:rPr lang="en-GB" sz="2400" dirty="0"/>
+              <a:t>How can this be optimised?</a:t>
+            </a:r>
+          </a:p>
+        </p:txBody>
+      </p:sp>
     </p:spTree>
     <p:extLst>
       <p:ext uri="{BB962C8B-B14F-4D97-AF65-F5344CB8AC3E}">
@@ -9518,6 +9743,18 @@
   <p:clrMapOvr>
     <a:masterClrMapping/>
   </p:clrMapOvr>
+  <mc:AlternateContent xmlns:mc="http://schemas.openxmlformats.org/markup-compatibility/2006">
+    <mc:Choice xmlns:p14="http://schemas.microsoft.com/office/powerpoint/2010/main" Requires="p14">
+      <p:transition spd="med" p14:dur="700">
+        <p:fade/>
+      </p:transition>
+    </mc:Choice>
+    <mc:Fallback>
+      <p:transition spd="med">
+        <p:fade/>
+      </p:transition>
+    </mc:Fallback>
+  </mc:AlternateContent>
   <p:timing>
     <p:tnLst>
       <p:par>
@@ -9982,6 +10219,59 @@
                       </p:childTnLst>
                     </p:cTn>
                   </p:par>
+                  <p:par>
+                    <p:cTn id="43" fill="hold">
+                      <p:stCondLst>
+                        <p:cond delay="indefinite"/>
+                      </p:stCondLst>
+                      <p:childTnLst>
+                        <p:par>
+                          <p:cTn id="44" fill="hold">
+                            <p:stCondLst>
+                              <p:cond delay="0"/>
+                            </p:stCondLst>
+                            <p:childTnLst>
+                              <p:par>
+                                <p:cTn id="45" presetID="10" presetClass="entr" presetSubtype="0" fill="hold" grpId="0" nodeType="clickEffect">
+                                  <p:stCondLst>
+                                    <p:cond delay="0"/>
+                                  </p:stCondLst>
+                                  <p:childTnLst>
+                                    <p:set>
+                                      <p:cBhvr>
+                                        <p:cTn id="46" dur="1" fill="hold">
+                                          <p:stCondLst>
+                                            <p:cond delay="0"/>
+                                          </p:stCondLst>
+                                        </p:cTn>
+                                        <p:tgtEl>
+                                          <p:spTgt spid="6"/>
+                                        </p:tgtEl>
+                                        <p:attrNameLst>
+                                          <p:attrName>style.visibility</p:attrName>
+                                        </p:attrNameLst>
+                                      </p:cBhvr>
+                                      <p:to>
+                                        <p:strVal val="visible"/>
+                                      </p:to>
+                                    </p:set>
+                                    <p:animEffect transition="in" filter="fade">
+                                      <p:cBhvr>
+                                        <p:cTn id="47" dur="500"/>
+                                        <p:tgtEl>
+                                          <p:spTgt spid="6"/>
+                                        </p:tgtEl>
+                                      </p:cBhvr>
+                                    </p:animEffect>
+                                  </p:childTnLst>
+                                </p:cTn>
+                              </p:par>
+                            </p:childTnLst>
+                          </p:cTn>
+                        </p:par>
+                      </p:childTnLst>
+                    </p:cTn>
+                  </p:par>
                 </p:childTnLst>
               </p:cTn>
               <p:prevCondLst>
@@ -10003,6 +10293,9 @@
         </p:cTn>
       </p:par>
     </p:tnLst>
+    <p:bldLst>
+      <p:bldP spid="6" grpId="0"/>
+    </p:bldLst>
   </p:timing>
 </p:sld>
 </file>
@@ -11155,6 +11448,18 @@
   <p:clrMapOvr>
     <a:masterClrMapping/>
   </p:clrMapOvr>
+  <mc:AlternateContent xmlns:mc="http://schemas.openxmlformats.org/markup-compatibility/2006">
+    <mc:Choice xmlns:p14="http://schemas.microsoft.com/office/powerpoint/2010/main" Requires="p14">
+      <p:transition spd="med" p14:dur="700">
+        <p:fade/>
+      </p:transition>
+    </mc:Choice>
+    <mc:Fallback>
+      <p:transition spd="med">
+        <p:fade/>
+      </p:transition>
+    </mc:Fallback>
+  </mc:AlternateContent>
   <p:timing>
     <p:tnLst>
       <p:par>
@@ -11641,6 +11946,18 @@
   <p:clrMapOvr>
     <a:masterClrMapping/>
   </p:clrMapOvr>
+  <mc:AlternateContent xmlns:mc="http://schemas.openxmlformats.org/markup-compatibility/2006">
+    <mc:Choice xmlns:p14="http://schemas.microsoft.com/office/powerpoint/2010/main" Requires="p14">
+      <p:transition spd="med" p14:dur="700">
+        <p:fade/>
+      </p:transition>
+    </mc:Choice>
+    <mc:Fallback>
+      <p:transition spd="med">
+        <p:fade/>
+      </p:transition>
+    </mc:Fallback>
+  </mc:AlternateContent>
 </p:sld>
 </file>
 
@@ -11700,6 +12017,18 @@
   <p:clrMapOvr>
     <a:masterClrMapping/>
   </p:clrMapOvr>
+  <mc:AlternateContent xmlns:mc="http://schemas.openxmlformats.org/markup-compatibility/2006">
+    <mc:Choice xmlns:p14="http://schemas.microsoft.com/office/powerpoint/2010/main" Requires="p14">
+      <p:transition spd="med" p14:dur="700">
+        <p:fade/>
+      </p:transition>
+    </mc:Choice>
+    <mc:Fallback>
+      <p:transition spd="med">
+        <p:fade/>
+      </p:transition>
+    </mc:Fallback>
+  </mc:AlternateContent>
 </p:sld>
 </file>
 
@@ -11759,6 +12088,18 @@
   <p:clrMapOvr>
     <a:masterClrMapping/>
   </p:clrMapOvr>
+  <mc:AlternateContent xmlns:mc="http://schemas.openxmlformats.org/markup-compatibility/2006">
+    <mc:Choice xmlns:p14="http://schemas.microsoft.com/office/powerpoint/2010/main" Requires="p14">
+      <p:transition spd="med" p14:dur="700">
+        <p:fade/>
+      </p:transition>
+    </mc:Choice>
+    <mc:Fallback>
+      <p:transition spd="med">
+        <p:fade/>
+      </p:transition>
+    </mc:Fallback>
+  </mc:AlternateContent>
 </p:sld>
 </file>
 
@@ -11804,7 +12145,7 @@
               <a:rPr lang="en-US" dirty="0">
                 <a:latin typeface="Gill Sans MT" panose="020B0502020104020203" pitchFamily="34" charset="77"/>
               </a:rPr>
-              <a:t>data</a:t>
+              <a:t>reactivity and data</a:t>
             </a:r>
           </a:p>
         </p:txBody>
@@ -11833,7 +12174,7 @@
         </p:spPr>
         <p:txBody>
           <a:bodyPr>
-            <a:normAutofit/>
+            <a:normAutofit fontScale="92500" lnSpcReduction="10000"/>
           </a:bodyPr>
           <a:lstStyle/>
           <a:p>
@@ -11842,6 +12183,27 @@
                 <a:latin typeface="Gill Sans MT" panose="020B0502020104020203" pitchFamily="34" charset="77"/>
               </a:rPr>
               <a:t>Think about the format of your data</a:t>
+            </a:r>
+          </a:p>
+          <a:p>
+            <a:pPr lvl="1"/>
+            <a:r>
+              <a:rPr lang="en-US" sz="2200" dirty="0">
+                <a:latin typeface="Gill Sans MT" panose="020B0502020104020203" pitchFamily="34" charset="77"/>
+              </a:rPr>
+              <a:t>Is there any element that is </a:t>
+            </a:r>
+            <a:r>
+              <a:rPr lang="en-US" sz="2200" i="1" dirty="0">
+                <a:latin typeface="Gill Sans MT" panose="020B0502020104020203" pitchFamily="34" charset="77"/>
+              </a:rPr>
+              <a:t>always</a:t>
+            </a:r>
+            <a:r>
+              <a:rPr lang="en-US" sz="2200" dirty="0">
+                <a:latin typeface="Gill Sans MT" panose="020B0502020104020203" pitchFamily="34" charset="77"/>
+              </a:rPr>
+              <a:t> carried out?</a:t>
             </a:r>
           </a:p>
           <a:p>
@@ -11873,6 +12235,27 @@
             </a:r>
           </a:p>
           <a:p>
+            <a:pPr lvl="1"/>
+            <a:r>
+              <a:rPr lang="en-US" sz="2200" dirty="0">
+                <a:latin typeface="Gill Sans MT" panose="020B0502020104020203" pitchFamily="34" charset="77"/>
+              </a:rPr>
+              <a:t>Reactivity should be linked with elements of data that </a:t>
+            </a:r>
+            <a:r>
+              <a:rPr lang="en-US" sz="2200" u="sng" dirty="0">
+                <a:latin typeface="Gill Sans MT" panose="020B0502020104020203" pitchFamily="34" charset="77"/>
+              </a:rPr>
+              <a:t>depend</a:t>
+            </a:r>
+            <a:r>
+              <a:rPr lang="en-US" sz="2200" dirty="0">
+                <a:latin typeface="Gill Sans MT" panose="020B0502020104020203" pitchFamily="34" charset="77"/>
+              </a:rPr>
+              <a:t> on the inputs</a:t>
+            </a:r>
+          </a:p>
+          <a:p>
             <a:pPr marL="0" indent="0">
               <a:buNone/>
             </a:pPr>
@@ -11900,6 +12283,18 @@
   <p:clrMapOvr>
     <a:masterClrMapping/>
   </p:clrMapOvr>
+  <mc:AlternateContent xmlns:mc="http://schemas.openxmlformats.org/markup-compatibility/2006">
+    <mc:Choice xmlns:p14="http://schemas.microsoft.com/office/powerpoint/2010/main" Requires="p14">
+      <p:transition spd="med" p14:dur="700">
+        <p:fade/>
+      </p:transition>
+    </mc:Choice>
+    <mc:Fallback>
+      <p:transition spd="med">
+        <p:fade/>
+      </p:transition>
+    </mc:Fallback>
+  </mc:AlternateContent>
 </p:sld>
 </file>
 
@@ -11920,6 +12315,39 @@
           <a:chExt cx="0" cy="0"/>
         </a:xfrm>
       </p:grpSpPr>
+      <p:sp>
+        <p:nvSpPr>
+          <p:cNvPr id="2" name="Title 1">
+            <a:extLst>
+              <a:ext uri="{FF2B5EF4-FFF2-40B4-BE49-F238E27FC236}">
+                <a16:creationId xmlns:a16="http://schemas.microsoft.com/office/drawing/2014/main" id="{F560081F-A342-4579-9B7E-79A0CE291D18}"/>
+              </a:ext>
+            </a:extLst>
+          </p:cNvPr>
+          <p:cNvSpPr>
+            <a:spLocks noGrp="1"/>
+          </p:cNvSpPr>
+          <p:nvPr>
+            <p:ph type="title"/>
+          </p:nvPr>
+        </p:nvSpPr>
+        <p:spPr>
+          <a:xfrm>
+            <a:off x="685801" y="609600"/>
+            <a:ext cx="10131425" cy="728133"/>
+          </a:xfrm>
+        </p:spPr>
+        <p:txBody>
+          <a:bodyPr/>
+          <a:lstStyle/>
+          <a:p>
+            <a:r>
+              <a:rPr lang="en-GB" dirty="0"/>
+              <a:t>What if my app using complex calculations?</a:t>
+            </a:r>
+          </a:p>
+        </p:txBody>
+      </p:sp>
       <p:pic>
         <p:nvPicPr>
           <p:cNvPr id="5" name="Content Placeholder 4" descr="A screenshot of a graph&#10;&#10;Description automatically generated with medium confidence">
@@ -11933,19 +12361,19 @@
             <a:picLocks noGrp="1" noChangeAspect="1"/>
           </p:cNvPicPr>
           <p:nvPr>
-            <p:ph idx="1"/>
+            <p:ph idx="4294967295"/>
           </p:nvPr>
         </p:nvPicPr>
         <p:blipFill>
-          <a:blip r:embed="rId2"/>
+          <a:blip r:embed="rId3"/>
           <a:stretch>
             <a:fillRect/>
           </a:stretch>
         </p:blipFill>
         <p:spPr>
           <a:xfrm>
-            <a:off x="0" y="255587"/>
-            <a:ext cx="12187239" cy="6102350"/>
+            <a:off x="685801" y="1337733"/>
+            <a:ext cx="10329863" cy="5172075"/>
           </a:xfrm>
         </p:spPr>
       </p:pic>
@@ -11959,6 +12387,18 @@
   <p:clrMapOvr>
     <a:masterClrMapping/>
   </p:clrMapOvr>
+  <mc:AlternateContent xmlns:mc="http://schemas.openxmlformats.org/markup-compatibility/2006">
+    <mc:Choice xmlns:p14="http://schemas.microsoft.com/office/powerpoint/2010/main" Requires="p14">
+      <p:transition spd="med" p14:dur="700">
+        <p:fade/>
+      </p:transition>
+    </mc:Choice>
+    <mc:Fallback>
+      <p:transition spd="med">
+        <p:fade/>
+      </p:transition>
+    </mc:Fallback>
+  </mc:AlternateContent>
 </p:sld>
 </file>
 
@@ -12333,6 +12773,18 @@
   <p:clrMapOvr>
     <a:masterClrMapping/>
   </p:clrMapOvr>
+  <mc:AlternateContent xmlns:mc="http://schemas.openxmlformats.org/markup-compatibility/2006">
+    <mc:Choice xmlns:p14="http://schemas.microsoft.com/office/powerpoint/2010/main" Requires="p14">
+      <p:transition spd="med" p14:dur="700">
+        <p:fade/>
+      </p:transition>
+    </mc:Choice>
+    <mc:Fallback>
+      <p:transition spd="med">
+        <p:fade/>
+      </p:transition>
+    </mc:Fallback>
+  </mc:AlternateContent>
 </p:sld>
 </file>
 
@@ -12355,10 +12807,10 @@
       </p:grpSpPr>
       <p:sp>
         <p:nvSpPr>
-          <p:cNvPr id="4" name="Rounded Rectangle 3">
+          <p:cNvPr id="7" name="Right Arrow 6">
             <a:extLst>
               <a:ext uri="{FF2B5EF4-FFF2-40B4-BE49-F238E27FC236}">
-                <a16:creationId xmlns:a16="http://schemas.microsoft.com/office/drawing/2014/main" id="{C5C50627-2E6A-B9C4-7418-87D4439A110B}"/>
+                <a16:creationId xmlns:a16="http://schemas.microsoft.com/office/drawing/2014/main" id="{D1D9C5A7-AABA-FCE5-5133-2B4BAA8D22BF}"/>
               </a:ext>
             </a:extLst>
           </p:cNvPr>
@@ -12367,10 +12819,10 @@
         </p:nvSpPr>
         <p:spPr>
           <a:xfrm>
-            <a:off x="614363" y="2031208"/>
-            <a:ext cx="2871788" cy="2207418"/>
-          </a:xfrm>
-          <a:prstGeom prst="roundRect">
+            <a:off x="3669506" y="2906317"/>
+            <a:ext cx="585788" cy="522683"/>
+          </a:xfrm>
+          <a:prstGeom prst="rightArrow">
             <a:avLst/>
           </a:prstGeom>
         </p:spPr>
@@ -12401,10 +12853,10 @@
       </p:sp>
       <p:sp>
         <p:nvSpPr>
-          <p:cNvPr id="5" name="Rounded Rectangle 4">
+          <p:cNvPr id="8" name="Right Arrow 7">
             <a:extLst>
               <a:ext uri="{FF2B5EF4-FFF2-40B4-BE49-F238E27FC236}">
-                <a16:creationId xmlns:a16="http://schemas.microsoft.com/office/drawing/2014/main" id="{B75DA14F-C1B5-7A84-A6F5-1751C1A2BAF4}"/>
+                <a16:creationId xmlns:a16="http://schemas.microsoft.com/office/drawing/2014/main" id="{8D109CC6-3BED-B2DB-3976-EB7A94AEBACC}"/>
               </a:ext>
             </a:extLst>
           </p:cNvPr>
@@ -12413,10 +12865,10 @@
         </p:nvSpPr>
         <p:spPr>
           <a:xfrm>
-            <a:off x="4438650" y="2031208"/>
-            <a:ext cx="2871788" cy="2207418"/>
-          </a:xfrm>
-          <a:prstGeom prst="roundRect">
+            <a:off x="7491412" y="2873575"/>
+            <a:ext cx="585788" cy="522683"/>
+          </a:xfrm>
+          <a:prstGeom prst="rightArrow">
             <a:avLst/>
           </a:prstGeom>
         </p:spPr>
@@ -12441,262 +12893,325 @@
           <a:lstStyle/>
           <a:p>
             <a:pPr algn="ctr"/>
-            <a:endParaRPr lang="en-US" dirty="0"/>
-          </a:p>
-        </p:txBody>
-      </p:sp>
-      <p:sp>
-        <p:nvSpPr>
-          <p:cNvPr id="6" name="Rounded Rectangle 5">
+            <a:endParaRPr lang="en-US"/>
+          </a:p>
+        </p:txBody>
+      </p:sp>
+      <p:grpSp>
+        <p:nvGrpSpPr>
+          <p:cNvPr id="2" name="Group 1">
             <a:extLst>
               <a:ext uri="{FF2B5EF4-FFF2-40B4-BE49-F238E27FC236}">
-                <a16:creationId xmlns:a16="http://schemas.microsoft.com/office/drawing/2014/main" id="{1F41B35D-1008-CA42-1C36-5DD89A48C8D6}"/>
+                <a16:creationId xmlns:a16="http://schemas.microsoft.com/office/drawing/2014/main" id="{7F42CFA6-5085-4791-BD47-90B2BA05F29D}"/>
               </a:ext>
             </a:extLst>
           </p:cNvPr>
-          <p:cNvSpPr/>
+          <p:cNvGrpSpPr/>
           <p:nvPr/>
-        </p:nvSpPr>
-        <p:spPr>
-          <a:xfrm>
-            <a:off x="8262937" y="2031208"/>
+        </p:nvGrpSpPr>
+        <p:grpSpPr>
+          <a:xfrm>
+            <a:off x="614363" y="2031208"/>
             <a:ext cx="2871788" cy="2207418"/>
-          </a:xfrm>
-          <a:prstGeom prst="roundRect">
-            <a:avLst/>
-          </a:prstGeom>
-        </p:spPr>
-        <p:style>
-          <a:lnRef idx="2">
-            <a:schemeClr val="accent1">
-              <a:shade val="15000"/>
-            </a:schemeClr>
-          </a:lnRef>
-          <a:fillRef idx="1">
-            <a:schemeClr val="accent1"/>
-          </a:fillRef>
-          <a:effectRef idx="0">
-            <a:schemeClr val="accent1"/>
-          </a:effectRef>
-          <a:fontRef idx="minor">
-            <a:schemeClr val="lt1"/>
-          </a:fontRef>
-        </p:style>
-        <p:txBody>
-          <a:bodyPr rtlCol="0" anchor="ctr"/>
-          <a:lstStyle/>
-          <a:p>
-            <a:pPr algn="ctr"/>
-            <a:endParaRPr lang="en-US"/>
-          </a:p>
-        </p:txBody>
-      </p:sp>
-      <p:sp>
-        <p:nvSpPr>
-          <p:cNvPr id="7" name="Right Arrow 6">
+            <a:chOff x="614363" y="2031208"/>
+            <a:chExt cx="2871788" cy="2207418"/>
+          </a:xfrm>
+        </p:grpSpPr>
+        <p:sp>
+          <p:nvSpPr>
+            <p:cNvPr id="4" name="Rounded Rectangle 3">
+              <a:extLst>
+                <a:ext uri="{FF2B5EF4-FFF2-40B4-BE49-F238E27FC236}">
+                  <a16:creationId xmlns:a16="http://schemas.microsoft.com/office/drawing/2014/main" id="{C5C50627-2E6A-B9C4-7418-87D4439A110B}"/>
+                </a:ext>
+              </a:extLst>
+            </p:cNvPr>
+            <p:cNvSpPr/>
+            <p:nvPr/>
+          </p:nvSpPr>
+          <p:spPr>
+            <a:xfrm>
+              <a:off x="614363" y="2031208"/>
+              <a:ext cx="2871788" cy="2207418"/>
+            </a:xfrm>
+            <a:prstGeom prst="roundRect">
+              <a:avLst/>
+            </a:prstGeom>
+          </p:spPr>
+          <p:style>
+            <a:lnRef idx="2">
+              <a:schemeClr val="accent1">
+                <a:shade val="15000"/>
+              </a:schemeClr>
+            </a:lnRef>
+            <a:fillRef idx="1">
+              <a:schemeClr val="accent1"/>
+            </a:fillRef>
+            <a:effectRef idx="0">
+              <a:schemeClr val="accent1"/>
+            </a:effectRef>
+            <a:fontRef idx="minor">
+              <a:schemeClr val="lt1"/>
+            </a:fontRef>
+          </p:style>
+          <p:txBody>
+            <a:bodyPr rtlCol="0" anchor="ctr"/>
+            <a:lstStyle/>
+            <a:p>
+              <a:pPr algn="ctr"/>
+              <a:endParaRPr lang="en-US"/>
+            </a:p>
+          </p:txBody>
+        </p:sp>
+        <p:sp>
+          <p:nvSpPr>
+            <p:cNvPr id="9" name="TextBox 8">
+              <a:extLst>
+                <a:ext uri="{FF2B5EF4-FFF2-40B4-BE49-F238E27FC236}">
+                  <a16:creationId xmlns:a16="http://schemas.microsoft.com/office/drawing/2014/main" id="{2D56B6D1-1C92-D833-66B7-1F69DADD28EF}"/>
+                </a:ext>
+              </a:extLst>
+            </p:cNvPr>
+            <p:cNvSpPr txBox="1"/>
+            <p:nvPr/>
+          </p:nvSpPr>
+          <p:spPr>
+            <a:xfrm>
+              <a:off x="957263" y="2457450"/>
+              <a:ext cx="2143125" cy="1200329"/>
+            </a:xfrm>
+            <a:prstGeom prst="rect">
+              <a:avLst/>
+            </a:prstGeom>
+            <a:noFill/>
+          </p:spPr>
+          <p:txBody>
+            <a:bodyPr wrap="square" rtlCol="0">
+              <a:spAutoFit/>
+            </a:bodyPr>
+            <a:lstStyle/>
+            <a:p>
+              <a:pPr algn="ctr"/>
+              <a:r>
+                <a:rPr lang="en-US" sz="2400" dirty="0">
+                  <a:latin typeface="Gill Sans MT" panose="020B0502020104020203" pitchFamily="34" charset="77"/>
+                </a:rPr>
+                <a:t>Change value of an input slider</a:t>
+              </a:r>
+            </a:p>
+          </p:txBody>
+        </p:sp>
+      </p:grpSp>
+      <p:grpSp>
+        <p:nvGrpSpPr>
+          <p:cNvPr id="13" name="Group 12">
             <a:extLst>
               <a:ext uri="{FF2B5EF4-FFF2-40B4-BE49-F238E27FC236}">
-                <a16:creationId xmlns:a16="http://schemas.microsoft.com/office/drawing/2014/main" id="{D1D9C5A7-AABA-FCE5-5133-2B4BAA8D22BF}"/>
+                <a16:creationId xmlns:a16="http://schemas.microsoft.com/office/drawing/2014/main" id="{EDC462F1-2674-43DF-B881-4F6668A47CF3}"/>
               </a:ext>
             </a:extLst>
           </p:cNvPr>
-          <p:cNvSpPr/>
+          <p:cNvGrpSpPr/>
           <p:nvPr/>
-        </p:nvSpPr>
-        <p:spPr>
-          <a:xfrm>
-            <a:off x="3669506" y="2906317"/>
-            <a:ext cx="585788" cy="522683"/>
-          </a:xfrm>
-          <a:prstGeom prst="rightArrow">
-            <a:avLst/>
-          </a:prstGeom>
-        </p:spPr>
-        <p:style>
-          <a:lnRef idx="2">
-            <a:schemeClr val="accent1">
-              <a:shade val="15000"/>
-            </a:schemeClr>
-          </a:lnRef>
-          <a:fillRef idx="1">
-            <a:schemeClr val="accent1"/>
-          </a:fillRef>
-          <a:effectRef idx="0">
-            <a:schemeClr val="accent1"/>
-          </a:effectRef>
-          <a:fontRef idx="minor">
-            <a:schemeClr val="lt1"/>
-          </a:fontRef>
-        </p:style>
-        <p:txBody>
-          <a:bodyPr rtlCol="0" anchor="ctr"/>
-          <a:lstStyle/>
-          <a:p>
-            <a:pPr algn="ctr"/>
-            <a:endParaRPr lang="en-US"/>
-          </a:p>
-        </p:txBody>
-      </p:sp>
-      <p:sp>
-        <p:nvSpPr>
-          <p:cNvPr id="8" name="Right Arrow 7">
+        </p:nvGrpSpPr>
+        <p:grpSpPr>
+          <a:xfrm>
+            <a:off x="4438650" y="2031208"/>
+            <a:ext cx="2871788" cy="2207418"/>
+            <a:chOff x="4438650" y="2031208"/>
+            <a:chExt cx="2871788" cy="2207418"/>
+          </a:xfrm>
+        </p:grpSpPr>
+        <p:sp>
+          <p:nvSpPr>
+            <p:cNvPr id="5" name="Rounded Rectangle 4">
+              <a:extLst>
+                <a:ext uri="{FF2B5EF4-FFF2-40B4-BE49-F238E27FC236}">
+                  <a16:creationId xmlns:a16="http://schemas.microsoft.com/office/drawing/2014/main" id="{B75DA14F-C1B5-7A84-A6F5-1751C1A2BAF4}"/>
+                </a:ext>
+              </a:extLst>
+            </p:cNvPr>
+            <p:cNvSpPr/>
+            <p:nvPr/>
+          </p:nvSpPr>
+          <p:spPr>
+            <a:xfrm>
+              <a:off x="4438650" y="2031208"/>
+              <a:ext cx="2871788" cy="2207418"/>
+            </a:xfrm>
+            <a:prstGeom prst="roundRect">
+              <a:avLst/>
+            </a:prstGeom>
+          </p:spPr>
+          <p:style>
+            <a:lnRef idx="2">
+              <a:schemeClr val="accent1">
+                <a:shade val="15000"/>
+              </a:schemeClr>
+            </a:lnRef>
+            <a:fillRef idx="1">
+              <a:schemeClr val="accent1"/>
+            </a:fillRef>
+            <a:effectRef idx="0">
+              <a:schemeClr val="accent1"/>
+            </a:effectRef>
+            <a:fontRef idx="minor">
+              <a:schemeClr val="lt1"/>
+            </a:fontRef>
+          </p:style>
+          <p:txBody>
+            <a:bodyPr rtlCol="0" anchor="ctr"/>
+            <a:lstStyle/>
+            <a:p>
+              <a:pPr algn="ctr"/>
+              <a:endParaRPr lang="en-US" dirty="0"/>
+            </a:p>
+          </p:txBody>
+        </p:sp>
+        <p:sp>
+          <p:nvSpPr>
+            <p:cNvPr id="10" name="TextBox 9">
+              <a:extLst>
+                <a:ext uri="{FF2B5EF4-FFF2-40B4-BE49-F238E27FC236}">
+                  <a16:creationId xmlns:a16="http://schemas.microsoft.com/office/drawing/2014/main" id="{B7825A19-E77D-6968-E3E5-043333DAD075}"/>
+                </a:ext>
+              </a:extLst>
+            </p:cNvPr>
+            <p:cNvSpPr txBox="1"/>
+            <p:nvPr/>
+          </p:nvSpPr>
+          <p:spPr>
+            <a:xfrm>
+              <a:off x="4766072" y="2272784"/>
+              <a:ext cx="2216943" cy="1569660"/>
+            </a:xfrm>
+            <a:prstGeom prst="rect">
+              <a:avLst/>
+            </a:prstGeom>
+            <a:noFill/>
+          </p:spPr>
+          <p:txBody>
+            <a:bodyPr wrap="square" rtlCol="0">
+              <a:spAutoFit/>
+            </a:bodyPr>
+            <a:lstStyle/>
+            <a:p>
+              <a:pPr algn="ctr"/>
+              <a:r>
+                <a:rPr lang="en-US" sz="2400" dirty="0">
+                  <a:latin typeface="Gill Sans MT" panose="020B0502020104020203" pitchFamily="34" charset="77"/>
+                </a:rPr>
+                <a:t>Run a statistical model (slow, computationally expensive)</a:t>
+              </a:r>
+            </a:p>
+          </p:txBody>
+        </p:sp>
+      </p:grpSp>
+      <p:grpSp>
+        <p:nvGrpSpPr>
+          <p:cNvPr id="14" name="Group 13">
             <a:extLst>
               <a:ext uri="{FF2B5EF4-FFF2-40B4-BE49-F238E27FC236}">
-                <a16:creationId xmlns:a16="http://schemas.microsoft.com/office/drawing/2014/main" id="{8D109CC6-3BED-B2DB-3976-EB7A94AEBACC}"/>
+                <a16:creationId xmlns:a16="http://schemas.microsoft.com/office/drawing/2014/main" id="{FA31CD5C-E503-43C8-B768-0D0687A83175}"/>
               </a:ext>
             </a:extLst>
           </p:cNvPr>
-          <p:cNvSpPr/>
+          <p:cNvGrpSpPr/>
           <p:nvPr/>
-        </p:nvSpPr>
-        <p:spPr>
-          <a:xfrm>
-            <a:off x="7491412" y="2873575"/>
-            <a:ext cx="585788" cy="522683"/>
-          </a:xfrm>
-          <a:prstGeom prst="rightArrow">
-            <a:avLst/>
-          </a:prstGeom>
-        </p:spPr>
-        <p:style>
-          <a:lnRef idx="2">
-            <a:schemeClr val="accent1">
-              <a:shade val="15000"/>
-            </a:schemeClr>
-          </a:lnRef>
-          <a:fillRef idx="1">
-            <a:schemeClr val="accent1"/>
-          </a:fillRef>
-          <a:effectRef idx="0">
-            <a:schemeClr val="accent1"/>
-          </a:effectRef>
-          <a:fontRef idx="minor">
-            <a:schemeClr val="lt1"/>
-          </a:fontRef>
-        </p:style>
-        <p:txBody>
-          <a:bodyPr rtlCol="0" anchor="ctr"/>
-          <a:lstStyle/>
-          <a:p>
-            <a:pPr algn="ctr"/>
-            <a:endParaRPr lang="en-US"/>
-          </a:p>
-        </p:txBody>
-      </p:sp>
-      <p:sp>
-        <p:nvSpPr>
-          <p:cNvPr id="9" name="TextBox 8">
-            <a:extLst>
-              <a:ext uri="{FF2B5EF4-FFF2-40B4-BE49-F238E27FC236}">
-                <a16:creationId xmlns:a16="http://schemas.microsoft.com/office/drawing/2014/main" id="{2D56B6D1-1C92-D833-66B7-1F69DADD28EF}"/>
-              </a:ext>
-            </a:extLst>
-          </p:cNvPr>
-          <p:cNvSpPr txBox="1"/>
-          <p:nvPr/>
-        </p:nvSpPr>
-        <p:spPr>
-          <a:xfrm>
-            <a:off x="957263" y="2457450"/>
-            <a:ext cx="2143125" cy="1200329"/>
-          </a:xfrm>
-          <a:prstGeom prst="rect">
-            <a:avLst/>
-          </a:prstGeom>
-          <a:noFill/>
-        </p:spPr>
-        <p:txBody>
-          <a:bodyPr wrap="square" rtlCol="0">
-            <a:spAutoFit/>
-          </a:bodyPr>
-          <a:lstStyle/>
-          <a:p>
-            <a:pPr algn="ctr"/>
-            <a:r>
-              <a:rPr lang="en-US" sz="2400" dirty="0">
-                <a:latin typeface="Gill Sans MT" panose="020B0502020104020203" pitchFamily="34" charset="77"/>
-              </a:rPr>
-              <a:t>Change value of an input slider</a:t>
-            </a:r>
-          </a:p>
-        </p:txBody>
-      </p:sp>
-      <p:sp>
-        <p:nvSpPr>
-          <p:cNvPr id="10" name="TextBox 9">
-            <a:extLst>
-              <a:ext uri="{FF2B5EF4-FFF2-40B4-BE49-F238E27FC236}">
-                <a16:creationId xmlns:a16="http://schemas.microsoft.com/office/drawing/2014/main" id="{B7825A19-E77D-6968-E3E5-043333DAD075}"/>
-              </a:ext>
-            </a:extLst>
-          </p:cNvPr>
-          <p:cNvSpPr txBox="1"/>
-          <p:nvPr/>
-        </p:nvSpPr>
-        <p:spPr>
-          <a:xfrm>
-            <a:off x="4766072" y="2272784"/>
-            <a:ext cx="2216943" cy="1569660"/>
-          </a:xfrm>
-          <a:prstGeom prst="rect">
-            <a:avLst/>
-          </a:prstGeom>
-          <a:noFill/>
-        </p:spPr>
-        <p:txBody>
-          <a:bodyPr wrap="square" rtlCol="0">
-            <a:spAutoFit/>
-          </a:bodyPr>
-          <a:lstStyle/>
-          <a:p>
-            <a:pPr algn="ctr"/>
-            <a:r>
-              <a:rPr lang="en-US" sz="2400" dirty="0">
-                <a:latin typeface="Gill Sans MT" panose="020B0502020104020203" pitchFamily="34" charset="77"/>
-              </a:rPr>
-              <a:t>Run a statistical model (slow, computationally expensive)</a:t>
-            </a:r>
-          </a:p>
-        </p:txBody>
-      </p:sp>
-      <p:sp>
-        <p:nvSpPr>
-          <p:cNvPr id="11" name="TextBox 10">
-            <a:extLst>
-              <a:ext uri="{FF2B5EF4-FFF2-40B4-BE49-F238E27FC236}">
-                <a16:creationId xmlns:a16="http://schemas.microsoft.com/office/drawing/2014/main" id="{0B7E588B-9AAE-A3FD-7B8B-F2E12090B902}"/>
-              </a:ext>
-            </a:extLst>
-          </p:cNvPr>
-          <p:cNvSpPr txBox="1"/>
-          <p:nvPr/>
-        </p:nvSpPr>
-        <p:spPr>
-          <a:xfrm>
-            <a:off x="8672512" y="2598003"/>
-            <a:ext cx="2052638" cy="830997"/>
-          </a:xfrm>
-          <a:prstGeom prst="rect">
-            <a:avLst/>
-          </a:prstGeom>
-          <a:noFill/>
-        </p:spPr>
-        <p:txBody>
-          <a:bodyPr wrap="square" rtlCol="0">
-            <a:spAutoFit/>
-          </a:bodyPr>
-          <a:lstStyle/>
-          <a:p>
-            <a:pPr algn="ctr"/>
-            <a:r>
-              <a:rPr lang="en-US" sz="2400" dirty="0">
-                <a:latin typeface="Gill Sans MT" panose="020B0502020104020203" pitchFamily="34" charset="77"/>
-              </a:rPr>
-              <a:t>Update plot output</a:t>
-            </a:r>
-          </a:p>
-        </p:txBody>
-      </p:sp>
+        </p:nvGrpSpPr>
+        <p:grpSpPr>
+          <a:xfrm>
+            <a:off x="8262937" y="2031208"/>
+            <a:ext cx="2871788" cy="2207418"/>
+            <a:chOff x="8262937" y="2031208"/>
+            <a:chExt cx="2871788" cy="2207418"/>
+          </a:xfrm>
+        </p:grpSpPr>
+        <p:sp>
+          <p:nvSpPr>
+            <p:cNvPr id="6" name="Rounded Rectangle 5">
+              <a:extLst>
+                <a:ext uri="{FF2B5EF4-FFF2-40B4-BE49-F238E27FC236}">
+                  <a16:creationId xmlns:a16="http://schemas.microsoft.com/office/drawing/2014/main" id="{1F41B35D-1008-CA42-1C36-5DD89A48C8D6}"/>
+                </a:ext>
+              </a:extLst>
+            </p:cNvPr>
+            <p:cNvSpPr/>
+            <p:nvPr/>
+          </p:nvSpPr>
+          <p:spPr>
+            <a:xfrm>
+              <a:off x="8262937" y="2031208"/>
+              <a:ext cx="2871788" cy="2207418"/>
+            </a:xfrm>
+            <a:prstGeom prst="roundRect">
+              <a:avLst/>
+            </a:prstGeom>
+          </p:spPr>
+          <p:style>
+            <a:lnRef idx="2">
+              <a:schemeClr val="accent1">
+                <a:shade val="15000"/>
+              </a:schemeClr>
+            </a:lnRef>
+            <a:fillRef idx="1">
+              <a:schemeClr val="accent1"/>
+            </a:fillRef>
+            <a:effectRef idx="0">
+              <a:schemeClr val="accent1"/>
+            </a:effectRef>
+            <a:fontRef idx="minor">
+              <a:schemeClr val="lt1"/>
+            </a:fontRef>
+          </p:style>
+          <p:txBody>
+            <a:bodyPr rtlCol="0" anchor="ctr"/>
+            <a:lstStyle/>
+            <a:p>
+              <a:pPr algn="ctr"/>
+              <a:endParaRPr lang="en-US"/>
+            </a:p>
+          </p:txBody>
+        </p:sp>
+        <p:sp>
+          <p:nvSpPr>
+            <p:cNvPr id="11" name="TextBox 10">
+              <a:extLst>
+                <a:ext uri="{FF2B5EF4-FFF2-40B4-BE49-F238E27FC236}">
+                  <a16:creationId xmlns:a16="http://schemas.microsoft.com/office/drawing/2014/main" id="{0B7E588B-9AAE-A3FD-7B8B-F2E12090B902}"/>
+                </a:ext>
+              </a:extLst>
+            </p:cNvPr>
+            <p:cNvSpPr txBox="1"/>
+            <p:nvPr/>
+          </p:nvSpPr>
+          <p:spPr>
+            <a:xfrm>
+              <a:off x="8672512" y="2598003"/>
+              <a:ext cx="2052638" cy="830997"/>
+            </a:xfrm>
+            <a:prstGeom prst="rect">
+              <a:avLst/>
+            </a:prstGeom>
+            <a:noFill/>
+          </p:spPr>
+          <p:txBody>
+            <a:bodyPr wrap="square" rtlCol="0">
+              <a:spAutoFit/>
+            </a:bodyPr>
+            <a:lstStyle/>
+            <a:p>
+              <a:pPr algn="ctr"/>
+              <a:r>
+                <a:rPr lang="en-US" sz="2400" dirty="0">
+                  <a:latin typeface="Gill Sans MT" panose="020B0502020104020203" pitchFamily="34" charset="77"/>
+                </a:rPr>
+                <a:t>Update plot output</a:t>
+              </a:r>
+            </a:p>
+          </p:txBody>
+        </p:sp>
+      </p:grpSp>
       <p:pic>
         <p:nvPicPr>
           <p:cNvPr id="3" name="Graphic 2" descr="Close with solid fill">
@@ -12733,6 +13248,216 @@
           </a:prstGeom>
         </p:spPr>
       </p:pic>
+      <p:grpSp>
+        <p:nvGrpSpPr>
+          <p:cNvPr id="15" name="Group 14">
+            <a:extLst>
+              <a:ext uri="{FF2B5EF4-FFF2-40B4-BE49-F238E27FC236}">
+                <a16:creationId xmlns:a16="http://schemas.microsoft.com/office/drawing/2014/main" id="{26DE6F97-5664-4A39-9EFA-3A9B8FCBE8BA}"/>
+              </a:ext>
+            </a:extLst>
+          </p:cNvPr>
+          <p:cNvGrpSpPr/>
+          <p:nvPr/>
+        </p:nvGrpSpPr>
+        <p:grpSpPr>
+          <a:xfrm>
+            <a:off x="614363" y="3469588"/>
+            <a:ext cx="2871788" cy="2207418"/>
+            <a:chOff x="614363" y="2031208"/>
+            <a:chExt cx="2871788" cy="2207418"/>
+          </a:xfrm>
+        </p:grpSpPr>
+        <p:sp>
+          <p:nvSpPr>
+            <p:cNvPr id="16" name="Rounded Rectangle 3">
+              <a:extLst>
+                <a:ext uri="{FF2B5EF4-FFF2-40B4-BE49-F238E27FC236}">
+                  <a16:creationId xmlns:a16="http://schemas.microsoft.com/office/drawing/2014/main" id="{333B0216-5D81-4250-9502-D78ED918EEE0}"/>
+                </a:ext>
+              </a:extLst>
+            </p:cNvPr>
+            <p:cNvSpPr/>
+            <p:nvPr/>
+          </p:nvSpPr>
+          <p:spPr>
+            <a:xfrm>
+              <a:off x="614363" y="2031208"/>
+              <a:ext cx="2871788" cy="2207418"/>
+            </a:xfrm>
+            <a:prstGeom prst="roundRect">
+              <a:avLst/>
+            </a:prstGeom>
+          </p:spPr>
+          <p:style>
+            <a:lnRef idx="2">
+              <a:schemeClr val="accent1">
+                <a:shade val="15000"/>
+              </a:schemeClr>
+            </a:lnRef>
+            <a:fillRef idx="1">
+              <a:schemeClr val="accent1"/>
+            </a:fillRef>
+            <a:effectRef idx="0">
+              <a:schemeClr val="accent1"/>
+            </a:effectRef>
+            <a:fontRef idx="minor">
+              <a:schemeClr val="lt1"/>
+            </a:fontRef>
+          </p:style>
+          <p:txBody>
+            <a:bodyPr rtlCol="0" anchor="ctr"/>
+            <a:lstStyle/>
+            <a:p>
+              <a:pPr algn="ctr"/>
+              <a:endParaRPr lang="en-US"/>
+            </a:p>
+          </p:txBody>
+        </p:sp>
+        <p:sp>
+          <p:nvSpPr>
+            <p:cNvPr id="17" name="TextBox 16">
+              <a:extLst>
+                <a:ext uri="{FF2B5EF4-FFF2-40B4-BE49-F238E27FC236}">
+                  <a16:creationId xmlns:a16="http://schemas.microsoft.com/office/drawing/2014/main" id="{2A5DF6EE-ED38-439F-928B-9E929B4334D1}"/>
+                </a:ext>
+              </a:extLst>
+            </p:cNvPr>
+            <p:cNvSpPr txBox="1"/>
+            <p:nvPr/>
+          </p:nvSpPr>
+          <p:spPr>
+            <a:xfrm>
+              <a:off x="957263" y="2457450"/>
+              <a:ext cx="2143125" cy="1200329"/>
+            </a:xfrm>
+            <a:prstGeom prst="rect">
+              <a:avLst/>
+            </a:prstGeom>
+            <a:noFill/>
+          </p:spPr>
+          <p:txBody>
+            <a:bodyPr wrap="square" rtlCol="0">
+              <a:spAutoFit/>
+            </a:bodyPr>
+            <a:lstStyle/>
+            <a:p>
+              <a:pPr algn="ctr"/>
+              <a:r>
+                <a:rPr lang="en-US" sz="2400" dirty="0">
+                  <a:latin typeface="Gill Sans MT" panose="020B0502020104020203" pitchFamily="34" charset="77"/>
+                </a:rPr>
+                <a:t>Change value of an input slider</a:t>
+              </a:r>
+            </a:p>
+          </p:txBody>
+        </p:sp>
+      </p:grpSp>
+      <p:grpSp>
+        <p:nvGrpSpPr>
+          <p:cNvPr id="18" name="Group 17">
+            <a:extLst>
+              <a:ext uri="{FF2B5EF4-FFF2-40B4-BE49-F238E27FC236}">
+                <a16:creationId xmlns:a16="http://schemas.microsoft.com/office/drawing/2014/main" id="{40C1A88C-DA59-4D92-B508-130CE725A460}"/>
+              </a:ext>
+            </a:extLst>
+          </p:cNvPr>
+          <p:cNvGrpSpPr/>
+          <p:nvPr/>
+        </p:nvGrpSpPr>
+        <p:grpSpPr>
+          <a:xfrm>
+            <a:off x="614363" y="4650582"/>
+            <a:ext cx="2871788" cy="2207418"/>
+            <a:chOff x="614363" y="2031208"/>
+            <a:chExt cx="2871788" cy="2207418"/>
+          </a:xfrm>
+        </p:grpSpPr>
+        <p:sp>
+          <p:nvSpPr>
+            <p:cNvPr id="19" name="Rounded Rectangle 3">
+              <a:extLst>
+                <a:ext uri="{FF2B5EF4-FFF2-40B4-BE49-F238E27FC236}">
+                  <a16:creationId xmlns:a16="http://schemas.microsoft.com/office/drawing/2014/main" id="{E1B8FC48-56C2-4925-A9F9-DBED638425F0}"/>
+                </a:ext>
+              </a:extLst>
+            </p:cNvPr>
+            <p:cNvSpPr/>
+            <p:nvPr/>
+          </p:nvSpPr>
+          <p:spPr>
+            <a:xfrm>
+              <a:off x="614363" y="2031208"/>
+              <a:ext cx="2871788" cy="2207418"/>
+            </a:xfrm>
+            <a:prstGeom prst="roundRect">
+              <a:avLst/>
+            </a:prstGeom>
+          </p:spPr>
+          <p:style>
+            <a:lnRef idx="2">
+              <a:schemeClr val="accent1">
+                <a:shade val="15000"/>
+              </a:schemeClr>
+            </a:lnRef>
+            <a:fillRef idx="1">
+              <a:schemeClr val="accent1"/>
+            </a:fillRef>
+            <a:effectRef idx="0">
+              <a:schemeClr val="accent1"/>
+            </a:effectRef>
+            <a:fontRef idx="minor">
+              <a:schemeClr val="lt1"/>
+            </a:fontRef>
+          </p:style>
+          <p:txBody>
+            <a:bodyPr rtlCol="0" anchor="ctr"/>
+            <a:lstStyle/>
+            <a:p>
+              <a:pPr algn="ctr"/>
+              <a:endParaRPr lang="en-US"/>
+            </a:p>
+          </p:txBody>
+        </p:sp>
+        <p:sp>
+          <p:nvSpPr>
+            <p:cNvPr id="20" name="TextBox 19">
+              <a:extLst>
+                <a:ext uri="{FF2B5EF4-FFF2-40B4-BE49-F238E27FC236}">
+                  <a16:creationId xmlns:a16="http://schemas.microsoft.com/office/drawing/2014/main" id="{C887307B-08C9-42FB-8F34-DD0CD214275B}"/>
+                </a:ext>
+              </a:extLst>
+            </p:cNvPr>
+            <p:cNvSpPr txBox="1"/>
+            <p:nvPr/>
+          </p:nvSpPr>
+          <p:spPr>
+            <a:xfrm>
+              <a:off x="957263" y="2457450"/>
+              <a:ext cx="2143125" cy="1200329"/>
+            </a:xfrm>
+            <a:prstGeom prst="rect">
+              <a:avLst/>
+            </a:prstGeom>
+            <a:noFill/>
+          </p:spPr>
+          <p:txBody>
+            <a:bodyPr wrap="square" rtlCol="0">
+              <a:spAutoFit/>
+            </a:bodyPr>
+            <a:lstStyle/>
+            <a:p>
+              <a:pPr algn="ctr"/>
+              <a:r>
+                <a:rPr lang="en-US" sz="2400" dirty="0">
+                  <a:latin typeface="Gill Sans MT" panose="020B0502020104020203" pitchFamily="34" charset="77"/>
+                </a:rPr>
+                <a:t>Change value of an input slider</a:t>
+              </a:r>
+            </a:p>
+          </p:txBody>
+        </p:sp>
+      </p:grpSp>
     </p:spTree>
     <p:extLst>
       <p:ext uri="{BB962C8B-B14F-4D97-AF65-F5344CB8AC3E}">
@@ -12743,6 +13468,18 @@
   <p:clrMapOvr>
     <a:masterClrMapping/>
   </p:clrMapOvr>
+  <mc:AlternateContent xmlns:mc="http://schemas.openxmlformats.org/markup-compatibility/2006">
+    <mc:Choice xmlns:p14="http://schemas.microsoft.com/office/powerpoint/2010/main" Requires="p14">
+      <p:transition spd="med" p14:dur="700">
+        <p:fade/>
+      </p:transition>
+    </mc:Choice>
+    <mc:Fallback>
+      <p:transition spd="med">
+        <p:fade/>
+      </p:transition>
+    </mc:Fallback>
+  </mc:AlternateContent>
   <p:timing>
     <p:tnLst>
       <p:par>
@@ -12764,7 +13501,7 @@
                             </p:stCondLst>
                             <p:childTnLst>
                               <p:par>
-                                <p:cTn id="5" presetID="1" presetClass="entr" presetSubtype="0" fill="hold" nodeType="clickEffect">
+                                <p:cTn id="5" presetID="10" presetClass="entr" presetSubtype="0" fill="hold" nodeType="clickEffect">
                                   <p:stCondLst>
                                     <p:cond delay="0"/>
                                   </p:stCondLst>
@@ -12772,6 +13509,103 @@
                                     <p:set>
                                       <p:cBhvr>
                                         <p:cTn id="6" dur="1" fill="hold">
+                                          <p:stCondLst>
+                                            <p:cond delay="0"/>
+                                          </p:stCondLst>
+                                        </p:cTn>
+                                        <p:tgtEl>
+                                          <p:spTgt spid="15"/>
+                                        </p:tgtEl>
+                                        <p:attrNameLst>
+                                          <p:attrName>style.visibility</p:attrName>
+                                        </p:attrNameLst>
+                                      </p:cBhvr>
+                                      <p:to>
+                                        <p:strVal val="visible"/>
+                                      </p:to>
+                                    </p:set>
+                                    <p:animEffect transition="in" filter="fade">
+                                      <p:cBhvr>
+                                        <p:cTn id="7" dur="500"/>
+                                        <p:tgtEl>
+                                          <p:spTgt spid="15"/>
+                                        </p:tgtEl>
+                                      </p:cBhvr>
+                                    </p:animEffect>
+                                  </p:childTnLst>
+                                </p:cTn>
+                              </p:par>
+                            </p:childTnLst>
+                          </p:cTn>
+                        </p:par>
+                        <p:par>
+                          <p:cTn id="8" fill="hold">
+                            <p:stCondLst>
+                              <p:cond delay="500"/>
+                            </p:stCondLst>
+                            <p:childTnLst>
+                              <p:par>
+                                <p:cTn id="9" presetID="10" presetClass="entr" presetSubtype="0" fill="hold" nodeType="afterEffect">
+                                  <p:stCondLst>
+                                    <p:cond delay="0"/>
+                                  </p:stCondLst>
+                                  <p:childTnLst>
+                                    <p:set>
+                                      <p:cBhvr>
+                                        <p:cTn id="10" dur="1" fill="hold">
+                                          <p:stCondLst>
+                                            <p:cond delay="0"/>
+                                          </p:stCondLst>
+                                        </p:cTn>
+                                        <p:tgtEl>
+                                          <p:spTgt spid="18"/>
+                                        </p:tgtEl>
+                                        <p:attrNameLst>
+                                          <p:attrName>style.visibility</p:attrName>
+                                        </p:attrNameLst>
+                                      </p:cBhvr>
+                                      <p:to>
+                                        <p:strVal val="visible"/>
+                                      </p:to>
+                                    </p:set>
+                                    <p:animEffect transition="in" filter="fade">
+                                      <p:cBhvr>
+                                        <p:cTn id="11" dur="500"/>
+                                        <p:tgtEl>
+                                          <p:spTgt spid="18"/>
+                                        </p:tgtEl>
+                                      </p:cBhvr>
+                                    </p:animEffect>
+                                  </p:childTnLst>
+                                </p:cTn>
+                              </p:par>
+                            </p:childTnLst>
+                          </p:cTn>
+                        </p:par>
+                      </p:childTnLst>
+                    </p:cTn>
+                  </p:par>
+                  <p:par>
+                    <p:cTn id="12" fill="hold">
+                      <p:stCondLst>
+                        <p:cond delay="indefinite"/>
+                      </p:stCondLst>
+                      <p:childTnLst>
+                        <p:par>
+                          <p:cTn id="13" fill="hold">
+                            <p:stCondLst>
+                              <p:cond delay="0"/>
+                            </p:stCondLst>
+                            <p:childTnLst>
+                              <p:par>
+                                <p:cTn id="14" presetID="10" presetClass="entr" presetSubtype="0" fill="hold" nodeType="clickEffect">
+                                  <p:stCondLst>
+                                    <p:cond delay="0"/>
+                                  </p:stCondLst>
+                                  <p:childTnLst>
+                                    <p:set>
+                                      <p:cBhvr>
+                                        <p:cTn id="15" dur="1" fill="hold">
                                           <p:stCondLst>
                                             <p:cond delay="0"/>
                                           </p:stCondLst>
@@ -12787,6 +13621,14 @@
                                         <p:strVal val="visible"/>
                                       </p:to>
                                     </p:set>
+                                    <p:animEffect transition="in" filter="fade">
+                                      <p:cBhvr>
+                                        <p:cTn id="16" dur="500"/>
+                                        <p:tgtEl>
+                                          <p:spTgt spid="3"/>
+                                        </p:tgtEl>
+                                      </p:cBhvr>
+                                    </p:animEffect>
                                   </p:childTnLst>
                                 </p:cTn>
                               </p:par>
@@ -12947,6 +13789,18 @@
   <p:clrMapOvr>
     <a:masterClrMapping/>
   </p:clrMapOvr>
+  <mc:AlternateContent xmlns:mc="http://schemas.openxmlformats.org/markup-compatibility/2006">
+    <mc:Choice xmlns:p14="http://schemas.microsoft.com/office/powerpoint/2010/main" Requires="p14">
+      <p:transition spd="med" p14:dur="700">
+        <p:fade/>
+      </p:transition>
+    </mc:Choice>
+    <mc:Fallback>
+      <p:transition spd="med">
+        <p:fade/>
+      </p:transition>
+    </mc:Fallback>
+  </mc:AlternateContent>
 </p:sld>
 </file>
 
@@ -12969,10 +13823,10 @@
       </p:grpSpPr>
       <p:sp>
         <p:nvSpPr>
-          <p:cNvPr id="2" name="Title 1">
+          <p:cNvPr id="6" name="Title 5">
             <a:extLst>
               <a:ext uri="{FF2B5EF4-FFF2-40B4-BE49-F238E27FC236}">
-                <a16:creationId xmlns:a16="http://schemas.microsoft.com/office/drawing/2014/main" id="{3CC88DF9-746D-F6B7-11AD-D3B3D66B97FC}"/>
+                <a16:creationId xmlns:a16="http://schemas.microsoft.com/office/drawing/2014/main" id="{5B0BB11D-9AC5-47C1-9D86-5A3BEDE64C03}"/>
               </a:ext>
             </a:extLst>
           </p:cNvPr>
@@ -12983,46 +13837,20 @@
             <p:ph type="title"/>
           </p:nvPr>
         </p:nvSpPr>
-        <p:spPr/>
+        <p:spPr>
+          <a:xfrm>
+            <a:off x="685801" y="609600"/>
+            <a:ext cx="10131425" cy="976029"/>
+          </a:xfrm>
+        </p:spPr>
         <p:txBody>
           <a:bodyPr/>
           <a:lstStyle/>
           <a:p>
-            <a:endParaRPr lang="en-US" dirty="0">
-              <a:latin typeface="Gill Sans MT" panose="020B0502020104020203" pitchFamily="34" charset="77"/>
-            </a:endParaRPr>
-          </a:p>
-        </p:txBody>
-      </p:sp>
-      <p:sp>
-        <p:nvSpPr>
-          <p:cNvPr id="3" name="Content Placeholder 2">
-            <a:extLst>
-              <a:ext uri="{FF2B5EF4-FFF2-40B4-BE49-F238E27FC236}">
-                <a16:creationId xmlns:a16="http://schemas.microsoft.com/office/drawing/2014/main" id="{DA0BFF85-144A-94C4-BE94-FBAD64D95DCC}"/>
-              </a:ext>
-            </a:extLst>
-          </p:cNvPr>
-          <p:cNvSpPr>
-            <a:spLocks noGrp="1"/>
-          </p:cNvSpPr>
-          <p:nvPr>
-            <p:ph idx="1"/>
-          </p:nvPr>
-        </p:nvSpPr>
-        <p:spPr/>
-        <p:txBody>
-          <a:bodyPr>
-            <a:normAutofit/>
-          </a:bodyPr>
-          <a:lstStyle/>
-          <a:p>
-            <a:pPr marL="0" indent="0">
-              <a:buNone/>
-            </a:pPr>
-            <a:endParaRPr lang="en-US" sz="2400" dirty="0">
-              <a:latin typeface="Gill Sans MT" panose="020B0502020104020203" pitchFamily="34" charset="77"/>
-            </a:endParaRPr>
+            <a:r>
+              <a:rPr lang="en-GB" dirty="0"/>
+              <a:t>Example app</a:t>
+            </a:r>
           </a:p>
         </p:txBody>
       </p:sp>
@@ -13041,15 +13869,15 @@
           <p:nvPr/>
         </p:nvPicPr>
         <p:blipFill>
-          <a:blip r:embed="rId2"/>
+          <a:blip r:embed="rId3"/>
           <a:stretch>
             <a:fillRect/>
           </a:stretch>
         </p:blipFill>
         <p:spPr>
           <a:xfrm>
-            <a:off x="291378" y="202655"/>
-            <a:ext cx="11609243" cy="6452689"/>
+            <a:off x="1208470" y="1585629"/>
+            <a:ext cx="9086085" cy="5050259"/>
           </a:xfrm>
           <a:prstGeom prst="rect">
             <a:avLst/>
@@ -13070,7 +13898,7 @@
         </p:nvSpPr>
         <p:spPr>
           <a:xfrm>
-            <a:off x="8207298" y="5926347"/>
+            <a:off x="6835698" y="6051113"/>
             <a:ext cx="3558878" cy="584775"/>
           </a:xfrm>
           <a:prstGeom prst="rect">
@@ -13090,7 +13918,7 @@
                   <a:schemeClr val="bg1"/>
                 </a:solidFill>
                 <a:latin typeface="Gill Sans MT" panose="020B0502020104020203" pitchFamily="34" charset="77"/>
-                <a:hlinkClick r:id="rId3">
+                <a:hlinkClick r:id="rId4">
                   <a:extLst>
                     <a:ext uri="{A12FA001-AC4F-418D-AE19-62706E023703}">
                       <ahyp:hlinkClr xmlns:ahyp="http://schemas.microsoft.com/office/drawing/2018/hyperlinkcolor" val="tx"/>
@@ -13119,6 +13947,18 @@
   <p:clrMapOvr>
     <a:masterClrMapping/>
   </p:clrMapOvr>
+  <mc:AlternateContent xmlns:mc="http://schemas.openxmlformats.org/markup-compatibility/2006">
+    <mc:Choice xmlns:p14="http://schemas.microsoft.com/office/powerpoint/2010/main" Requires="p14">
+      <p:transition spd="med" p14:dur="700">
+        <p:fade/>
+      </p:transition>
+    </mc:Choice>
+    <mc:Fallback>
+      <p:transition spd="med">
+        <p:fade/>
+      </p:transition>
+    </mc:Fallback>
+  </mc:AlternateContent>
 </p:sld>
 </file>
 
@@ -13224,6 +14064,18 @@
   <p:clrMapOvr>
     <a:masterClrMapping/>
   </p:clrMapOvr>
+  <mc:AlternateContent xmlns:mc="http://schemas.openxmlformats.org/markup-compatibility/2006">
+    <mc:Choice xmlns:p14="http://schemas.microsoft.com/office/powerpoint/2010/main" Requires="p14">
+      <p:transition spd="med" p14:dur="700">
+        <p:fade/>
+      </p:transition>
+    </mc:Choice>
+    <mc:Fallback>
+      <p:transition spd="med">
+        <p:fade/>
+      </p:transition>
+    </mc:Fallback>
+  </mc:AlternateContent>
 </p:sld>
 </file>
 
@@ -13383,6 +14235,18 @@
   <p:clrMapOvr>
     <a:masterClrMapping/>
   </p:clrMapOvr>
+  <mc:AlternateContent xmlns:mc="http://schemas.openxmlformats.org/markup-compatibility/2006">
+    <mc:Choice xmlns:p14="http://schemas.microsoft.com/office/powerpoint/2010/main" Requires="p14">
+      <p:transition spd="med" p14:dur="700">
+        <p:fade/>
+      </p:transition>
+    </mc:Choice>
+    <mc:Fallback>
+      <p:transition spd="med">
+        <p:fade/>
+      </p:transition>
+    </mc:Fallback>
+  </mc:AlternateContent>
 </p:sld>
 </file>
 
@@ -13405,6 +14269,705 @@
       </p:grpSpPr>
       <p:sp>
         <p:nvSpPr>
+          <p:cNvPr id="7" name="Right Arrow 6">
+            <a:extLst>
+              <a:ext uri="{FF2B5EF4-FFF2-40B4-BE49-F238E27FC236}">
+                <a16:creationId xmlns:a16="http://schemas.microsoft.com/office/drawing/2014/main" id="{D1D9C5A7-AABA-FCE5-5133-2B4BAA8D22BF}"/>
+              </a:ext>
+            </a:extLst>
+          </p:cNvPr>
+          <p:cNvSpPr/>
+          <p:nvPr/>
+        </p:nvSpPr>
+        <p:spPr>
+          <a:xfrm>
+            <a:off x="3669506" y="2906317"/>
+            <a:ext cx="585788" cy="522683"/>
+          </a:xfrm>
+          <a:prstGeom prst="rightArrow">
+            <a:avLst/>
+          </a:prstGeom>
+        </p:spPr>
+        <p:style>
+          <a:lnRef idx="2">
+            <a:schemeClr val="accent1">
+              <a:shade val="15000"/>
+            </a:schemeClr>
+          </a:lnRef>
+          <a:fillRef idx="1">
+            <a:schemeClr val="accent1"/>
+          </a:fillRef>
+          <a:effectRef idx="0">
+            <a:schemeClr val="accent1"/>
+          </a:effectRef>
+          <a:fontRef idx="minor">
+            <a:schemeClr val="lt1"/>
+          </a:fontRef>
+        </p:style>
+        <p:txBody>
+          <a:bodyPr rtlCol="0" anchor="ctr"/>
+          <a:lstStyle/>
+          <a:p>
+            <a:pPr algn="ctr"/>
+            <a:endParaRPr lang="en-US"/>
+          </a:p>
+        </p:txBody>
+      </p:sp>
+      <p:sp>
+        <p:nvSpPr>
+          <p:cNvPr id="8" name="Right Arrow 7">
+            <a:extLst>
+              <a:ext uri="{FF2B5EF4-FFF2-40B4-BE49-F238E27FC236}">
+                <a16:creationId xmlns:a16="http://schemas.microsoft.com/office/drawing/2014/main" id="{8D109CC6-3BED-B2DB-3976-EB7A94AEBACC}"/>
+              </a:ext>
+            </a:extLst>
+          </p:cNvPr>
+          <p:cNvSpPr/>
+          <p:nvPr/>
+        </p:nvSpPr>
+        <p:spPr>
+          <a:xfrm>
+            <a:off x="7491412" y="2873575"/>
+            <a:ext cx="585788" cy="522683"/>
+          </a:xfrm>
+          <a:prstGeom prst="rightArrow">
+            <a:avLst/>
+          </a:prstGeom>
+        </p:spPr>
+        <p:style>
+          <a:lnRef idx="2">
+            <a:schemeClr val="accent1">
+              <a:shade val="15000"/>
+            </a:schemeClr>
+          </a:lnRef>
+          <a:fillRef idx="1">
+            <a:schemeClr val="accent1"/>
+          </a:fillRef>
+          <a:effectRef idx="0">
+            <a:schemeClr val="accent1"/>
+          </a:effectRef>
+          <a:fontRef idx="minor">
+            <a:schemeClr val="lt1"/>
+          </a:fontRef>
+        </p:style>
+        <p:txBody>
+          <a:bodyPr rtlCol="0" anchor="ctr"/>
+          <a:lstStyle/>
+          <a:p>
+            <a:pPr algn="ctr"/>
+            <a:endParaRPr lang="en-US"/>
+          </a:p>
+        </p:txBody>
+      </p:sp>
+      <p:grpSp>
+        <p:nvGrpSpPr>
+          <p:cNvPr id="12" name="Group 11">
+            <a:extLst>
+              <a:ext uri="{FF2B5EF4-FFF2-40B4-BE49-F238E27FC236}">
+                <a16:creationId xmlns:a16="http://schemas.microsoft.com/office/drawing/2014/main" id="{D8D47B21-2842-4030-BFB2-B616FC597D76}"/>
+              </a:ext>
+            </a:extLst>
+          </p:cNvPr>
+          <p:cNvGrpSpPr/>
+          <p:nvPr/>
+        </p:nvGrpSpPr>
+        <p:grpSpPr>
+          <a:xfrm>
+            <a:off x="614363" y="2031208"/>
+            <a:ext cx="2871788" cy="2207418"/>
+            <a:chOff x="614363" y="2031208"/>
+            <a:chExt cx="2871788" cy="2207418"/>
+          </a:xfrm>
+        </p:grpSpPr>
+        <p:sp>
+          <p:nvSpPr>
+            <p:cNvPr id="4" name="Rounded Rectangle 3">
+              <a:extLst>
+                <a:ext uri="{FF2B5EF4-FFF2-40B4-BE49-F238E27FC236}">
+                  <a16:creationId xmlns:a16="http://schemas.microsoft.com/office/drawing/2014/main" id="{C5C50627-2E6A-B9C4-7418-87D4439A110B}"/>
+                </a:ext>
+              </a:extLst>
+            </p:cNvPr>
+            <p:cNvSpPr/>
+            <p:nvPr/>
+          </p:nvSpPr>
+          <p:spPr>
+            <a:xfrm>
+              <a:off x="614363" y="2031208"/>
+              <a:ext cx="2871788" cy="2207418"/>
+            </a:xfrm>
+            <a:prstGeom prst="roundRect">
+              <a:avLst/>
+            </a:prstGeom>
+          </p:spPr>
+          <p:style>
+            <a:lnRef idx="2">
+              <a:schemeClr val="accent1">
+                <a:shade val="15000"/>
+              </a:schemeClr>
+            </a:lnRef>
+            <a:fillRef idx="1">
+              <a:schemeClr val="accent1"/>
+            </a:fillRef>
+            <a:effectRef idx="0">
+              <a:schemeClr val="accent1"/>
+            </a:effectRef>
+            <a:fontRef idx="minor">
+              <a:schemeClr val="lt1"/>
+            </a:fontRef>
+          </p:style>
+          <p:txBody>
+            <a:bodyPr rtlCol="0" anchor="ctr"/>
+            <a:lstStyle/>
+            <a:p>
+              <a:pPr algn="ctr"/>
+              <a:endParaRPr lang="en-US"/>
+            </a:p>
+          </p:txBody>
+        </p:sp>
+        <p:sp>
+          <p:nvSpPr>
+            <p:cNvPr id="9" name="TextBox 8">
+              <a:extLst>
+                <a:ext uri="{FF2B5EF4-FFF2-40B4-BE49-F238E27FC236}">
+                  <a16:creationId xmlns:a16="http://schemas.microsoft.com/office/drawing/2014/main" id="{2D56B6D1-1C92-D833-66B7-1F69DADD28EF}"/>
+                </a:ext>
+              </a:extLst>
+            </p:cNvPr>
+            <p:cNvSpPr txBox="1"/>
+            <p:nvPr/>
+          </p:nvSpPr>
+          <p:spPr>
+            <a:xfrm>
+              <a:off x="957263" y="2457450"/>
+              <a:ext cx="2143125" cy="1200329"/>
+            </a:xfrm>
+            <a:prstGeom prst="rect">
+              <a:avLst/>
+            </a:prstGeom>
+            <a:noFill/>
+          </p:spPr>
+          <p:txBody>
+            <a:bodyPr wrap="square" rtlCol="0">
+              <a:spAutoFit/>
+            </a:bodyPr>
+            <a:lstStyle/>
+            <a:p>
+              <a:pPr algn="ctr"/>
+              <a:r>
+                <a:rPr lang="en-US" sz="2400" dirty="0">
+                  <a:latin typeface="Gill Sans MT" panose="020B0502020104020203" pitchFamily="34" charset="77"/>
+                </a:rPr>
+                <a:t>Change value of an input slider</a:t>
+              </a:r>
+            </a:p>
+          </p:txBody>
+        </p:sp>
+      </p:grpSp>
+      <p:grpSp>
+        <p:nvGrpSpPr>
+          <p:cNvPr id="13" name="Group 12">
+            <a:extLst>
+              <a:ext uri="{FF2B5EF4-FFF2-40B4-BE49-F238E27FC236}">
+                <a16:creationId xmlns:a16="http://schemas.microsoft.com/office/drawing/2014/main" id="{075A8CE6-19C8-4232-B278-8875A75B56BE}"/>
+              </a:ext>
+            </a:extLst>
+          </p:cNvPr>
+          <p:cNvGrpSpPr/>
+          <p:nvPr/>
+        </p:nvGrpSpPr>
+        <p:grpSpPr>
+          <a:xfrm>
+            <a:off x="4438650" y="2031208"/>
+            <a:ext cx="2871788" cy="2207418"/>
+            <a:chOff x="4438650" y="2031208"/>
+            <a:chExt cx="2871788" cy="2207418"/>
+          </a:xfrm>
+        </p:grpSpPr>
+        <p:sp>
+          <p:nvSpPr>
+            <p:cNvPr id="5" name="Rounded Rectangle 4">
+              <a:extLst>
+                <a:ext uri="{FF2B5EF4-FFF2-40B4-BE49-F238E27FC236}">
+                  <a16:creationId xmlns:a16="http://schemas.microsoft.com/office/drawing/2014/main" id="{B75DA14F-C1B5-7A84-A6F5-1751C1A2BAF4}"/>
+                </a:ext>
+              </a:extLst>
+            </p:cNvPr>
+            <p:cNvSpPr/>
+            <p:nvPr/>
+          </p:nvSpPr>
+          <p:spPr>
+            <a:xfrm>
+              <a:off x="4438650" y="2031208"/>
+              <a:ext cx="2871788" cy="2207418"/>
+            </a:xfrm>
+            <a:prstGeom prst="roundRect">
+              <a:avLst/>
+            </a:prstGeom>
+          </p:spPr>
+          <p:style>
+            <a:lnRef idx="2">
+              <a:schemeClr val="accent1">
+                <a:shade val="15000"/>
+              </a:schemeClr>
+            </a:lnRef>
+            <a:fillRef idx="1">
+              <a:schemeClr val="accent1"/>
+            </a:fillRef>
+            <a:effectRef idx="0">
+              <a:schemeClr val="accent1"/>
+            </a:effectRef>
+            <a:fontRef idx="minor">
+              <a:schemeClr val="lt1"/>
+            </a:fontRef>
+          </p:style>
+          <p:txBody>
+            <a:bodyPr rtlCol="0" anchor="ctr"/>
+            <a:lstStyle/>
+            <a:p>
+              <a:pPr algn="ctr"/>
+              <a:endParaRPr lang="en-US" dirty="0"/>
+            </a:p>
+          </p:txBody>
+        </p:sp>
+        <p:sp>
+          <p:nvSpPr>
+            <p:cNvPr id="10" name="TextBox 9">
+              <a:extLst>
+                <a:ext uri="{FF2B5EF4-FFF2-40B4-BE49-F238E27FC236}">
+                  <a16:creationId xmlns:a16="http://schemas.microsoft.com/office/drawing/2014/main" id="{B7825A19-E77D-6968-E3E5-043333DAD075}"/>
+                </a:ext>
+              </a:extLst>
+            </p:cNvPr>
+            <p:cNvSpPr txBox="1"/>
+            <p:nvPr/>
+          </p:nvSpPr>
+          <p:spPr>
+            <a:xfrm>
+              <a:off x="4766072" y="2272784"/>
+              <a:ext cx="2216943" cy="1569660"/>
+            </a:xfrm>
+            <a:prstGeom prst="rect">
+              <a:avLst/>
+            </a:prstGeom>
+            <a:noFill/>
+          </p:spPr>
+          <p:txBody>
+            <a:bodyPr wrap="square" rtlCol="0">
+              <a:spAutoFit/>
+            </a:bodyPr>
+            <a:lstStyle/>
+            <a:p>
+              <a:pPr algn="ctr"/>
+              <a:r>
+                <a:rPr lang="en-US" sz="2400" dirty="0">
+                  <a:latin typeface="Gill Sans MT" panose="020B0502020104020203" pitchFamily="34" charset="77"/>
+                </a:rPr>
+                <a:t>Run a statistical model (slow, computationally expensive)</a:t>
+              </a:r>
+            </a:p>
+          </p:txBody>
+        </p:sp>
+      </p:grpSp>
+      <p:grpSp>
+        <p:nvGrpSpPr>
+          <p:cNvPr id="14" name="Group 13">
+            <a:extLst>
+              <a:ext uri="{FF2B5EF4-FFF2-40B4-BE49-F238E27FC236}">
+                <a16:creationId xmlns:a16="http://schemas.microsoft.com/office/drawing/2014/main" id="{E5FF6C50-583B-4845-9AEC-7306EEC07B18}"/>
+              </a:ext>
+            </a:extLst>
+          </p:cNvPr>
+          <p:cNvGrpSpPr/>
+          <p:nvPr/>
+        </p:nvGrpSpPr>
+        <p:grpSpPr>
+          <a:xfrm>
+            <a:off x="8262937" y="2031208"/>
+            <a:ext cx="2871788" cy="2207418"/>
+            <a:chOff x="8262937" y="2031208"/>
+            <a:chExt cx="2871788" cy="2207418"/>
+          </a:xfrm>
+        </p:grpSpPr>
+        <p:sp>
+          <p:nvSpPr>
+            <p:cNvPr id="6" name="Rounded Rectangle 5">
+              <a:extLst>
+                <a:ext uri="{FF2B5EF4-FFF2-40B4-BE49-F238E27FC236}">
+                  <a16:creationId xmlns:a16="http://schemas.microsoft.com/office/drawing/2014/main" id="{1F41B35D-1008-CA42-1C36-5DD89A48C8D6}"/>
+                </a:ext>
+              </a:extLst>
+            </p:cNvPr>
+            <p:cNvSpPr/>
+            <p:nvPr/>
+          </p:nvSpPr>
+          <p:spPr>
+            <a:xfrm>
+              <a:off x="8262937" y="2031208"/>
+              <a:ext cx="2871788" cy="2207418"/>
+            </a:xfrm>
+            <a:prstGeom prst="roundRect">
+              <a:avLst/>
+            </a:prstGeom>
+          </p:spPr>
+          <p:style>
+            <a:lnRef idx="2">
+              <a:schemeClr val="accent1">
+                <a:shade val="15000"/>
+              </a:schemeClr>
+            </a:lnRef>
+            <a:fillRef idx="1">
+              <a:schemeClr val="accent1"/>
+            </a:fillRef>
+            <a:effectRef idx="0">
+              <a:schemeClr val="accent1"/>
+            </a:effectRef>
+            <a:fontRef idx="minor">
+              <a:schemeClr val="lt1"/>
+            </a:fontRef>
+          </p:style>
+          <p:txBody>
+            <a:bodyPr rtlCol="0" anchor="ctr"/>
+            <a:lstStyle/>
+            <a:p>
+              <a:pPr algn="ctr"/>
+              <a:endParaRPr lang="en-US"/>
+            </a:p>
+          </p:txBody>
+        </p:sp>
+        <p:sp>
+          <p:nvSpPr>
+            <p:cNvPr id="11" name="TextBox 10">
+              <a:extLst>
+                <a:ext uri="{FF2B5EF4-FFF2-40B4-BE49-F238E27FC236}">
+                  <a16:creationId xmlns:a16="http://schemas.microsoft.com/office/drawing/2014/main" id="{0B7E588B-9AAE-A3FD-7B8B-F2E12090B902}"/>
+                </a:ext>
+              </a:extLst>
+            </p:cNvPr>
+            <p:cNvSpPr txBox="1"/>
+            <p:nvPr/>
+          </p:nvSpPr>
+          <p:spPr>
+            <a:xfrm>
+              <a:off x="8672512" y="2598003"/>
+              <a:ext cx="2052638" cy="830997"/>
+            </a:xfrm>
+            <a:prstGeom prst="rect">
+              <a:avLst/>
+            </a:prstGeom>
+            <a:noFill/>
+          </p:spPr>
+          <p:txBody>
+            <a:bodyPr wrap="square" rtlCol="0">
+              <a:spAutoFit/>
+            </a:bodyPr>
+            <a:lstStyle/>
+            <a:p>
+              <a:pPr algn="ctr"/>
+              <a:r>
+                <a:rPr lang="en-US" sz="2400" dirty="0">
+                  <a:latin typeface="Gill Sans MT" panose="020B0502020104020203" pitchFamily="34" charset="77"/>
+                </a:rPr>
+                <a:t>Update plot output</a:t>
+              </a:r>
+            </a:p>
+          </p:txBody>
+        </p:sp>
+      </p:grpSp>
+      <p:sp>
+        <p:nvSpPr>
+          <p:cNvPr id="2" name="Rectangle: Rounded Corners 1">
+            <a:extLst>
+              <a:ext uri="{FF2B5EF4-FFF2-40B4-BE49-F238E27FC236}">
+                <a16:creationId xmlns:a16="http://schemas.microsoft.com/office/drawing/2014/main" id="{0EB09F23-600D-4CAC-BC68-3EABD5B34C4C}"/>
+              </a:ext>
+            </a:extLst>
+          </p:cNvPr>
+          <p:cNvSpPr/>
+          <p:nvPr/>
+        </p:nvSpPr>
+        <p:spPr>
+          <a:xfrm>
+            <a:off x="3589506" y="2873575"/>
+            <a:ext cx="663407" cy="555425"/>
+          </a:xfrm>
+          <a:prstGeom prst="roundRect">
+            <a:avLst/>
+          </a:prstGeom>
+        </p:spPr>
+        <p:style>
+          <a:lnRef idx="2">
+            <a:schemeClr val="accent1">
+              <a:shade val="50000"/>
+            </a:schemeClr>
+          </a:lnRef>
+          <a:fillRef idx="1">
+            <a:schemeClr val="accent1"/>
+          </a:fillRef>
+          <a:effectRef idx="0">
+            <a:schemeClr val="accent1"/>
+          </a:effectRef>
+          <a:fontRef idx="minor">
+            <a:schemeClr val="lt1"/>
+          </a:fontRef>
+        </p:style>
+        <p:txBody>
+          <a:bodyPr rtlCol="0" anchor="ctr"/>
+          <a:lstStyle/>
+          <a:p>
+            <a:pPr algn="ctr"/>
+            <a:r>
+              <a:rPr lang="en-GB" dirty="0"/>
+              <a:t>Run</a:t>
+            </a:r>
+          </a:p>
+        </p:txBody>
+      </p:sp>
+    </p:spTree>
+    <p:extLst>
+      <p:ext uri="{BB962C8B-B14F-4D97-AF65-F5344CB8AC3E}">
+        <p14:creationId xmlns:p14="http://schemas.microsoft.com/office/powerpoint/2010/main" val="1337119792"/>
+      </p:ext>
+    </p:extLst>
+  </p:cSld>
+  <p:clrMapOvr>
+    <a:masterClrMapping/>
+  </p:clrMapOvr>
+  <mc:AlternateContent xmlns:mc="http://schemas.openxmlformats.org/markup-compatibility/2006">
+    <mc:Choice xmlns:p14="http://schemas.microsoft.com/office/powerpoint/2010/main" Requires="p14">
+      <p:transition spd="med" p14:dur="700">
+        <p:fade/>
+      </p:transition>
+    </mc:Choice>
+    <mc:Fallback>
+      <p:transition spd="med">
+        <p:fade/>
+      </p:transition>
+    </mc:Fallback>
+  </mc:AlternateContent>
+  <p:timing>
+    <p:tnLst>
+      <p:par>
+        <p:cTn id="1" dur="indefinite" restart="never" nodeType="tmRoot">
+          <p:childTnLst>
+            <p:seq concurrent="1" nextAc="seek">
+              <p:cTn id="2" dur="indefinite" nodeType="mainSeq">
+                <p:childTnLst>
+                  <p:par>
+                    <p:cTn id="3" fill="hold">
+                      <p:stCondLst>
+                        <p:cond delay="indefinite"/>
+                      </p:stCondLst>
+                      <p:childTnLst>
+                        <p:par>
+                          <p:cTn id="4" fill="hold">
+                            <p:stCondLst>
+                              <p:cond delay="0"/>
+                            </p:stCondLst>
+                            <p:childTnLst>
+                              <p:par>
+                                <p:cTn id="5" presetID="10" presetClass="exit" presetSubtype="0" fill="hold" grpId="0" nodeType="clickEffect">
+                                  <p:stCondLst>
+                                    <p:cond delay="0"/>
+                                  </p:stCondLst>
+                                  <p:childTnLst>
+                                    <p:animEffect transition="out" filter="fade">
+                                      <p:cBhvr>
+                                        <p:cTn id="6" dur="500"/>
+                                        <p:tgtEl>
+                                          <p:spTgt spid="2"/>
+                                        </p:tgtEl>
+                                      </p:cBhvr>
+                                    </p:animEffect>
+                                    <p:set>
+                                      <p:cBhvr>
+                                        <p:cTn id="7" dur="1" fill="hold">
+                                          <p:stCondLst>
+                                            <p:cond delay="499"/>
+                                          </p:stCondLst>
+                                        </p:cTn>
+                                        <p:tgtEl>
+                                          <p:spTgt spid="2"/>
+                                        </p:tgtEl>
+                                        <p:attrNameLst>
+                                          <p:attrName>style.visibility</p:attrName>
+                                        </p:attrNameLst>
+                                      </p:cBhvr>
+                                      <p:to>
+                                        <p:strVal val="hidden"/>
+                                      </p:to>
+                                    </p:set>
+                                  </p:childTnLst>
+                                </p:cTn>
+                              </p:par>
+                            </p:childTnLst>
+                          </p:cTn>
+                        </p:par>
+                        <p:par>
+                          <p:cTn id="8" fill="hold">
+                            <p:stCondLst>
+                              <p:cond delay="500"/>
+                            </p:stCondLst>
+                            <p:childTnLst>
+                              <p:par>
+                                <p:cTn id="9" presetID="10" presetClass="entr" presetSubtype="0" fill="hold" grpId="0" nodeType="afterEffect">
+                                  <p:stCondLst>
+                                    <p:cond delay="0"/>
+                                  </p:stCondLst>
+                                  <p:childTnLst>
+                                    <p:set>
+                                      <p:cBhvr>
+                                        <p:cTn id="10" dur="1" fill="hold">
+                                          <p:stCondLst>
+                                            <p:cond delay="0"/>
+                                          </p:stCondLst>
+                                        </p:cTn>
+                                        <p:tgtEl>
+                                          <p:spTgt spid="8"/>
+                                        </p:tgtEl>
+                                        <p:attrNameLst>
+                                          <p:attrName>style.visibility</p:attrName>
+                                        </p:attrNameLst>
+                                      </p:cBhvr>
+                                      <p:to>
+                                        <p:strVal val="visible"/>
+                                      </p:to>
+                                    </p:set>
+                                    <p:animEffect transition="in" filter="fade">
+                                      <p:cBhvr>
+                                        <p:cTn id="11" dur="500"/>
+                                        <p:tgtEl>
+                                          <p:spTgt spid="8"/>
+                                        </p:tgtEl>
+                                      </p:cBhvr>
+                                    </p:animEffect>
+                                  </p:childTnLst>
+                                </p:cTn>
+                              </p:par>
+                              <p:par>
+                                <p:cTn id="12" presetID="10" presetClass="entr" presetSubtype="0" fill="hold" nodeType="withEffect">
+                                  <p:stCondLst>
+                                    <p:cond delay="0"/>
+                                  </p:stCondLst>
+                                  <p:childTnLst>
+                                    <p:set>
+                                      <p:cBhvr>
+                                        <p:cTn id="13" dur="1" fill="hold">
+                                          <p:stCondLst>
+                                            <p:cond delay="0"/>
+                                          </p:stCondLst>
+                                        </p:cTn>
+                                        <p:tgtEl>
+                                          <p:spTgt spid="13"/>
+                                        </p:tgtEl>
+                                        <p:attrNameLst>
+                                          <p:attrName>style.visibility</p:attrName>
+                                        </p:attrNameLst>
+                                      </p:cBhvr>
+                                      <p:to>
+                                        <p:strVal val="visible"/>
+                                      </p:to>
+                                    </p:set>
+                                    <p:animEffect transition="in" filter="fade">
+                                      <p:cBhvr>
+                                        <p:cTn id="14" dur="500"/>
+                                        <p:tgtEl>
+                                          <p:spTgt spid="13"/>
+                                        </p:tgtEl>
+                                      </p:cBhvr>
+                                    </p:animEffect>
+                                  </p:childTnLst>
+                                </p:cTn>
+                              </p:par>
+                              <p:par>
+                                <p:cTn id="15" presetID="10" presetClass="entr" presetSubtype="0" fill="hold" nodeType="withEffect">
+                                  <p:stCondLst>
+                                    <p:cond delay="0"/>
+                                  </p:stCondLst>
+                                  <p:childTnLst>
+                                    <p:set>
+                                      <p:cBhvr>
+                                        <p:cTn id="16" dur="1" fill="hold">
+                                          <p:stCondLst>
+                                            <p:cond delay="0"/>
+                                          </p:stCondLst>
+                                        </p:cTn>
+                                        <p:tgtEl>
+                                          <p:spTgt spid="14"/>
+                                        </p:tgtEl>
+                                        <p:attrNameLst>
+                                          <p:attrName>style.visibility</p:attrName>
+                                        </p:attrNameLst>
+                                      </p:cBhvr>
+                                      <p:to>
+                                        <p:strVal val="visible"/>
+                                      </p:to>
+                                    </p:set>
+                                    <p:animEffect transition="in" filter="fade">
+                                      <p:cBhvr>
+                                        <p:cTn id="17" dur="500"/>
+                                        <p:tgtEl>
+                                          <p:spTgt spid="14"/>
+                                        </p:tgtEl>
+                                      </p:cBhvr>
+                                    </p:animEffect>
+                                  </p:childTnLst>
+                                </p:cTn>
+                              </p:par>
+                            </p:childTnLst>
+                          </p:cTn>
+                        </p:par>
+                      </p:childTnLst>
+                    </p:cTn>
+                  </p:par>
+                </p:childTnLst>
+              </p:cTn>
+              <p:prevCondLst>
+                <p:cond evt="onPrev" delay="0">
+                  <p:tgtEl>
+                    <p:sldTgt/>
+                  </p:tgtEl>
+                </p:cond>
+              </p:prevCondLst>
+              <p:nextCondLst>
+                <p:cond evt="onNext" delay="0">
+                  <p:tgtEl>
+                    <p:sldTgt/>
+                  </p:tgtEl>
+                </p:cond>
+              </p:nextCondLst>
+            </p:seq>
+          </p:childTnLst>
+        </p:cTn>
+      </p:par>
+    </p:tnLst>
+    <p:bldLst>
+      <p:bldP spid="8" grpId="0" animBg="1"/>
+      <p:bldP spid="2" grpId="0" animBg="1"/>
+    </p:bldLst>
+  </p:timing>
+</p:sld>
+</file>
+
+<file path=ppt/slides/slide23.xml><?xml version="1.0" encoding="utf-8"?>
+<p:sld xmlns:a="http://schemas.openxmlformats.org/drawingml/2006/main" xmlns:r="http://schemas.openxmlformats.org/officeDocument/2006/relationships" xmlns:p="http://schemas.openxmlformats.org/presentationml/2006/main">
+  <p:cSld>
+    <p:spTree>
+      <p:nvGrpSpPr>
+        <p:cNvPr id="1" name=""/>
+        <p:cNvGrpSpPr/>
+        <p:nvPr/>
+      </p:nvGrpSpPr>
+      <p:grpSpPr>
+        <a:xfrm>
+          <a:off x="0" y="0"/>
+          <a:ext cx="0" cy="0"/>
+          <a:chOff x="0" y="0"/>
+          <a:chExt cx="0" cy="0"/>
+        </a:xfrm>
+      </p:grpSpPr>
+      <p:sp>
+        <p:nvSpPr>
           <p:cNvPr id="5" name="Content Placeholder 4">
             <a:extLst>
               <a:ext uri="{FF2B5EF4-FFF2-40B4-BE49-F238E27FC236}">
@@ -13537,6 +15100,18 @@
   <p:clrMapOvr>
     <a:masterClrMapping/>
   </p:clrMapOvr>
+  <mc:AlternateContent xmlns:mc="http://schemas.openxmlformats.org/markup-compatibility/2006">
+    <mc:Choice xmlns:p14="http://schemas.microsoft.com/office/powerpoint/2010/main" Requires="p14">
+      <p:transition spd="med" p14:dur="700">
+        <p:fade/>
+      </p:transition>
+    </mc:Choice>
+    <mc:Fallback>
+      <p:transition spd="med">
+        <p:fade/>
+      </p:transition>
+    </mc:Fallback>
+  </mc:AlternateContent>
 </p:sld>
 </file>
 
@@ -13681,6 +15256,18 @@
   <p:clrMapOvr>
     <a:masterClrMapping/>
   </p:clrMapOvr>
+  <mc:AlternateContent xmlns:mc="http://schemas.openxmlformats.org/markup-compatibility/2006">
+    <mc:Choice xmlns:p14="http://schemas.microsoft.com/office/powerpoint/2010/main" Requires="p14">
+      <p:transition spd="med" p14:dur="700">
+        <p:fade/>
+      </p:transition>
+    </mc:Choice>
+    <mc:Fallback>
+      <p:transition spd="med">
+        <p:fade/>
+      </p:transition>
+    </mc:Fallback>
+  </mc:AlternateContent>
 </p:sld>
 </file>
 
@@ -13779,6 +15366,18 @@
   <p:clrMapOvr>
     <a:masterClrMapping/>
   </p:clrMapOvr>
+  <mc:AlternateContent xmlns:mc="http://schemas.openxmlformats.org/markup-compatibility/2006">
+    <mc:Choice xmlns:p14="http://schemas.microsoft.com/office/powerpoint/2010/main" Requires="p14">
+      <p:transition spd="med" p14:dur="700">
+        <p:fade/>
+      </p:transition>
+    </mc:Choice>
+    <mc:Fallback>
+      <p:transition spd="med">
+        <p:fade/>
+      </p:transition>
+    </mc:Fallback>
+  </mc:AlternateContent>
   <p:timing>
     <p:tnLst>
       <p:par>
@@ -13906,7 +15505,7 @@
         </p:blipFill>
         <p:spPr>
           <a:xfrm>
-            <a:off x="48581" y="285750"/>
+            <a:off x="48581" y="457200"/>
             <a:ext cx="12094837" cy="5943600"/>
           </a:xfrm>
         </p:spPr>
@@ -13927,7 +15526,7 @@
         </p:nvCxnSpPr>
         <p:spPr>
           <a:xfrm>
-            <a:off x="2095928" y="1736332"/>
+            <a:off x="2095928" y="1907782"/>
             <a:ext cx="1582220" cy="0"/>
           </a:xfrm>
           <a:prstGeom prst="straightConnector1">
@@ -13962,6 +15561,18 @@
   <p:clrMapOvr>
     <a:masterClrMapping/>
   </p:clrMapOvr>
+  <mc:AlternateContent xmlns:mc="http://schemas.openxmlformats.org/markup-compatibility/2006">
+    <mc:Choice xmlns:p14="http://schemas.microsoft.com/office/powerpoint/2010/main" Requires="p14">
+      <p:transition spd="med" p14:dur="700">
+        <p:fade/>
+      </p:transition>
+    </mc:Choice>
+    <mc:Fallback>
+      <p:transition spd="med">
+        <p:fade/>
+      </p:transition>
+    </mc:Fallback>
+  </mc:AlternateContent>
   <p:timing>
     <p:tnLst>
       <p:par>
@@ -14145,6 +15756,18 @@
   <p:clrMapOvr>
     <a:masterClrMapping/>
   </p:clrMapOvr>
+  <mc:AlternateContent xmlns:mc="http://schemas.openxmlformats.org/markup-compatibility/2006">
+    <mc:Choice xmlns:p14="http://schemas.microsoft.com/office/powerpoint/2010/main" Requires="p14">
+      <p:transition spd="med" p14:dur="700">
+        <p:fade/>
+      </p:transition>
+    </mc:Choice>
+    <mc:Fallback>
+      <p:transition spd="med">
+        <p:fade/>
+      </p:transition>
+    </mc:Fallback>
+  </mc:AlternateContent>
   <p:timing>
     <p:tnLst>
       <p:par>
@@ -14287,6 +15910,18 @@
   <p:clrMapOvr>
     <a:masterClrMapping/>
   </p:clrMapOvr>
+  <mc:AlternateContent xmlns:mc="http://schemas.openxmlformats.org/markup-compatibility/2006">
+    <mc:Choice xmlns:p14="http://schemas.microsoft.com/office/powerpoint/2010/main" Requires="p14">
+      <p:transition spd="med" p14:dur="700">
+        <p:fade/>
+      </p:transition>
+    </mc:Choice>
+    <mc:Fallback>
+      <p:transition spd="med">
+        <p:fade/>
+      </p:transition>
+    </mc:Fallback>
+  </mc:AlternateContent>
 </p:sld>
 </file>
 
@@ -15199,6 +16834,18 @@
   <p:clrMapOvr>
     <a:masterClrMapping/>
   </p:clrMapOvr>
+  <mc:AlternateContent xmlns:mc="http://schemas.openxmlformats.org/markup-compatibility/2006">
+    <mc:Choice xmlns:p14="http://schemas.microsoft.com/office/powerpoint/2010/main" Requires="p14">
+      <p:transition spd="med" p14:dur="700">
+        <p:fade/>
+      </p:transition>
+    </mc:Choice>
+    <mc:Fallback>
+      <p:transition spd="med">
+        <p:fade/>
+      </p:transition>
+    </mc:Fallback>
+  </mc:AlternateContent>
 </p:sld>
 </file>
 
@@ -15319,6 +16966,18 @@
   <p:clrMapOvr>
     <a:masterClrMapping/>
   </p:clrMapOvr>
+  <mc:AlternateContent xmlns:mc="http://schemas.openxmlformats.org/markup-compatibility/2006">
+    <mc:Choice xmlns:p14="http://schemas.microsoft.com/office/powerpoint/2010/main" Requires="p14">
+      <p:transition spd="med" p14:dur="700">
+        <p:fade/>
+      </p:transition>
+    </mc:Choice>
+    <mc:Fallback>
+      <p:transition spd="med">
+        <p:fade/>
+      </p:transition>
+    </mc:Fallback>
+  </mc:AlternateContent>
 </p:sld>
 </file>
 

</xml_diff>